<commit_message>
Added old not saved presentation
</commit_message>
<xml_diff>
--- a/Notes/TFM_presentations/2020_04_05/2020_04_05.pptx
+++ b/Notes/TFM_presentations/2020_04_05/2020_04_05.pptx
@@ -5,7 +5,7 @@
     <p:sldMasterId id="2147483648" r:id="rId1"/>
   </p:sldMasterIdLst>
   <p:notesMasterIdLst>
-    <p:notesMasterId r:id="rId13"/>
+    <p:notesMasterId r:id="rId16"/>
   </p:notesMasterIdLst>
   <p:sldIdLst>
     <p:sldId id="256" r:id="rId2"/>
@@ -18,7 +18,10 @@
     <p:sldId id="261" r:id="rId9"/>
     <p:sldId id="318" r:id="rId10"/>
     <p:sldId id="316" r:id="rId11"/>
-    <p:sldId id="301" r:id="rId12"/>
+    <p:sldId id="319" r:id="rId12"/>
+    <p:sldId id="320" r:id="rId13"/>
+    <p:sldId id="321" r:id="rId14"/>
+    <p:sldId id="301" r:id="rId15"/>
   </p:sldIdLst>
   <p:sldSz cx="12192000" cy="6858000"/>
   <p:notesSz cx="6858000" cy="9144000"/>
@@ -221,7 +224,7 @@
           <a:p>
             <a:fld id="{D07E13D9-DB12-424B-A0B8-3D2EDA86849F}" type="datetimeFigureOut">
               <a:rPr lang="en-GB" smtClean="0"/>
-              <a:t>03/04/2020</a:t>
+              <a:t>06/04/2020</a:t>
             </a:fld>
             <a:endParaRPr lang="en-GB" dirty="0"/>
           </a:p>
@@ -3531,6 +3534,748 @@
     </p:spTree>
     <p:extLst>
       <p:ext uri="{BB962C8B-B14F-4D97-AF65-F5344CB8AC3E}">
+        <p14:creationId xmlns:p14="http://schemas.microsoft.com/office/powerpoint/2010/main" val="580834982"/>
+      </p:ext>
+    </p:extLst>
+  </p:cSld>
+  <p:clrMapOvr>
+    <a:masterClrMapping/>
+  </p:clrMapOvr>
+</p:notes>
+</file>
+
+<file path=ppt/notesSlides/notesSlide6.xml><?xml version="1.0" encoding="utf-8"?>
+<p:notes xmlns:a="http://schemas.openxmlformats.org/drawingml/2006/main" xmlns:r="http://schemas.openxmlformats.org/officeDocument/2006/relationships" xmlns:p="http://schemas.openxmlformats.org/presentationml/2006/main">
+  <p:cSld>
+    <p:spTree>
+      <p:nvGrpSpPr>
+        <p:cNvPr id="1" name=""/>
+        <p:cNvGrpSpPr/>
+        <p:nvPr/>
+      </p:nvGrpSpPr>
+      <p:grpSpPr>
+        <a:xfrm>
+          <a:off x="0" y="0"/>
+          <a:ext cx="0" cy="0"/>
+          <a:chOff x="0" y="0"/>
+          <a:chExt cx="0" cy="0"/>
+        </a:xfrm>
+      </p:grpSpPr>
+      <p:sp>
+        <p:nvSpPr>
+          <p:cNvPr id="2" name="Slide Image Placeholder 1"/>
+          <p:cNvSpPr>
+            <a:spLocks noGrp="1" noRot="1" noChangeAspect="1"/>
+          </p:cNvSpPr>
+          <p:nvPr>
+            <p:ph type="sldImg"/>
+          </p:nvPr>
+        </p:nvSpPr>
+        <p:spPr/>
+      </p:sp>
+      <p:sp>
+        <p:nvSpPr>
+          <p:cNvPr id="3" name="Notes Placeholder 2"/>
+          <p:cNvSpPr>
+            <a:spLocks noGrp="1"/>
+          </p:cNvSpPr>
+          <p:nvPr>
+            <p:ph type="body" idx="1"/>
+          </p:nvPr>
+        </p:nvSpPr>
+        <p:spPr/>
+        <p:txBody>
+          <a:bodyPr/>
+          <a:lstStyle/>
+          <a:p>
+            <a:r>
+              <a:rPr lang="en-150" dirty="0"/>
+              <a:t>F</a:t>
+            </a:r>
+            <a:r>
+              <a:rPr lang="en-GB" dirty="0"/>
+              <a:t>i</a:t>
+            </a:r>
+            <a:r>
+              <a:rPr lang="en-150" dirty="0"/>
+              <a:t>r</a:t>
+            </a:r>
+            <a:r>
+              <a:rPr lang="en-GB" dirty="0"/>
+              <a:t>s</a:t>
+            </a:r>
+            <a:r>
+              <a:rPr lang="en-150" dirty="0"/>
+              <a:t>t of all, let’</a:t>
+            </a:r>
+            <a:r>
+              <a:rPr lang="en-GB" dirty="0"/>
+              <a:t>s</a:t>
+            </a:r>
+            <a:r>
+              <a:rPr lang="en-150" dirty="0"/>
+              <a:t> </a:t>
+            </a:r>
+            <a:r>
+              <a:rPr lang="en-GB" dirty="0"/>
+              <a:t>e</a:t>
+            </a:r>
+            <a:r>
+              <a:rPr lang="en-150" dirty="0"/>
+              <a:t>x</a:t>
+            </a:r>
+            <a:r>
+              <a:rPr lang="en-GB" dirty="0"/>
+              <a:t>p</a:t>
+            </a:r>
+            <a:r>
+              <a:rPr lang="en-150" dirty="0"/>
+              <a:t>l</a:t>
+            </a:r>
+            <a:r>
+              <a:rPr lang="en-GB" dirty="0"/>
+              <a:t>a</a:t>
+            </a:r>
+            <a:r>
+              <a:rPr lang="en-150" dirty="0"/>
+              <a:t>i</a:t>
+            </a:r>
+            <a:r>
+              <a:rPr lang="en-GB" dirty="0"/>
+              <a:t>n</a:t>
+            </a:r>
+            <a:r>
+              <a:rPr lang="en-150" dirty="0"/>
+              <a:t> </a:t>
+            </a:r>
+            <a:r>
+              <a:rPr lang="en-GB" dirty="0"/>
+              <a:t>w</a:t>
+            </a:r>
+            <a:r>
+              <a:rPr lang="en-150" dirty="0"/>
+              <a:t>h</a:t>
+            </a:r>
+            <a:r>
+              <a:rPr lang="en-GB" dirty="0"/>
+              <a:t>a</a:t>
+            </a:r>
+            <a:r>
+              <a:rPr lang="en-150" dirty="0"/>
+              <a:t>t gang scheduling is.</a:t>
+            </a:r>
+          </a:p>
+          <a:p>
+            <a:endParaRPr lang="en-150" dirty="0"/>
+          </a:p>
+          <a:p>
+            <a:r>
+              <a:rPr lang="en-150" dirty="0"/>
+              <a:t>&lt;click&gt;</a:t>
+            </a:r>
+          </a:p>
+          <a:p>
+            <a:r>
+              <a:rPr lang="en-150" dirty="0"/>
+              <a:t>Le</a:t>
+            </a:r>
+            <a:r>
+              <a:rPr lang="en-GB" dirty="0"/>
+              <a:t>t</a:t>
+            </a:r>
+            <a:r>
+              <a:rPr lang="en-150" dirty="0"/>
+              <a:t>’</a:t>
+            </a:r>
+            <a:r>
+              <a:rPr lang="en-GB" dirty="0"/>
+              <a:t>s</a:t>
+            </a:r>
+            <a:r>
+              <a:rPr lang="en-150" dirty="0"/>
+              <a:t> </a:t>
+            </a:r>
+            <a:r>
+              <a:rPr lang="en-GB" dirty="0"/>
+              <a:t>s</a:t>
+            </a:r>
+            <a:r>
+              <a:rPr lang="en-150" dirty="0"/>
+              <a:t>a</a:t>
+            </a:r>
+            <a:r>
+              <a:rPr lang="en-GB" dirty="0"/>
+              <a:t>y</a:t>
+            </a:r>
+            <a:r>
+              <a:rPr lang="en-150" dirty="0"/>
+              <a:t> </a:t>
+            </a:r>
+            <a:r>
+              <a:rPr lang="en-GB" dirty="0"/>
+              <a:t>t</a:t>
+            </a:r>
+            <a:r>
+              <a:rPr lang="en-150" dirty="0"/>
+              <a:t>h</a:t>
+            </a:r>
+            <a:r>
+              <a:rPr lang="en-GB" dirty="0"/>
+              <a:t>a</a:t>
+            </a:r>
+            <a:r>
+              <a:rPr lang="en-150" dirty="0"/>
+              <a:t>t </a:t>
+            </a:r>
+            <a:r>
+              <a:rPr lang="en-GB" dirty="0"/>
+              <a:t>w</a:t>
+            </a:r>
+            <a:r>
+              <a:rPr lang="en-150" dirty="0"/>
+              <a:t>e </a:t>
+            </a:r>
+            <a:r>
+              <a:rPr lang="en-GB" dirty="0"/>
+              <a:t>h</a:t>
+            </a:r>
+            <a:r>
+              <a:rPr lang="en-150" dirty="0"/>
+              <a:t>a</a:t>
+            </a:r>
+            <a:r>
+              <a:rPr lang="en-GB" dirty="0"/>
+              <a:t>v</a:t>
+            </a:r>
+            <a:r>
+              <a:rPr lang="en-150" dirty="0"/>
+              <a:t>e </a:t>
+            </a:r>
+            <a:r>
+              <a:rPr lang="en-GB" dirty="0"/>
+              <a:t>m</a:t>
+            </a:r>
+            <a:r>
+              <a:rPr lang="en-150" dirty="0"/>
+              <a:t>u</a:t>
+            </a:r>
+            <a:r>
+              <a:rPr lang="en-GB" dirty="0"/>
+              <a:t>l</a:t>
+            </a:r>
+            <a:r>
+              <a:rPr lang="en-150" dirty="0"/>
+              <a:t>t</a:t>
+            </a:r>
+            <a:r>
+              <a:rPr lang="en-GB" dirty="0"/>
+              <a:t>i</a:t>
+            </a:r>
+            <a:r>
+              <a:rPr lang="en-150" dirty="0"/>
+              <a:t>p</a:t>
+            </a:r>
+            <a:r>
+              <a:rPr lang="en-GB" dirty="0"/>
+              <a:t>l</a:t>
+            </a:r>
+            <a:r>
+              <a:rPr lang="en-150" dirty="0"/>
+              <a:t>e </a:t>
+            </a:r>
+            <a:r>
+              <a:rPr lang="en-GB" dirty="0"/>
+              <a:t>t</a:t>
+            </a:r>
+            <a:r>
+              <a:rPr lang="en-150" dirty="0"/>
+              <a:t>h</a:t>
+            </a:r>
+            <a:r>
+              <a:rPr lang="en-GB" dirty="0"/>
+              <a:t>r</a:t>
+            </a:r>
+            <a:r>
+              <a:rPr lang="en-150" dirty="0"/>
+              <a:t>e</a:t>
+            </a:r>
+            <a:r>
+              <a:rPr lang="en-GB" dirty="0"/>
+              <a:t>a</a:t>
+            </a:r>
+            <a:r>
+              <a:rPr lang="en-150" dirty="0"/>
+              <a:t>d</a:t>
+            </a:r>
+            <a:r>
+              <a:rPr lang="en-GB" dirty="0"/>
+              <a:t>s</a:t>
+            </a:r>
+            <a:r>
+              <a:rPr lang="en-150" dirty="0"/>
+              <a:t> </a:t>
+            </a:r>
+            <a:r>
+              <a:rPr lang="en-GB" dirty="0"/>
+              <a:t>t</a:t>
+            </a:r>
+            <a:r>
+              <a:rPr lang="en-150" dirty="0"/>
+              <a:t>h</a:t>
+            </a:r>
+            <a:r>
+              <a:rPr lang="en-GB" dirty="0"/>
+              <a:t>a</a:t>
+            </a:r>
+            <a:r>
+              <a:rPr lang="en-150" dirty="0"/>
+              <a:t>t </a:t>
+            </a:r>
+            <a:r>
+              <a:rPr lang="en-GB" dirty="0"/>
+              <a:t>w</a:t>
+            </a:r>
+            <a:r>
+              <a:rPr lang="en-150" dirty="0"/>
+              <a:t>e </a:t>
+            </a:r>
+            <a:r>
+              <a:rPr lang="en-GB" dirty="0"/>
+              <a:t>w</a:t>
+            </a:r>
+            <a:r>
+              <a:rPr lang="en-150" dirty="0"/>
+              <a:t>a</a:t>
+            </a:r>
+            <a:r>
+              <a:rPr lang="en-GB" dirty="0"/>
+              <a:t>n</a:t>
+            </a:r>
+            <a:r>
+              <a:rPr lang="en-150" dirty="0"/>
+              <a:t>t </a:t>
+            </a:r>
+            <a:r>
+              <a:rPr lang="en-GB" dirty="0"/>
+              <a:t>t</a:t>
+            </a:r>
+            <a:r>
+              <a:rPr lang="en-150" dirty="0"/>
+              <a:t>o </a:t>
+            </a:r>
+            <a:r>
+              <a:rPr lang="en-GB" dirty="0"/>
+              <a:t>s</a:t>
+            </a:r>
+            <a:r>
+              <a:rPr lang="en-150" dirty="0"/>
+              <a:t>c</a:t>
+            </a:r>
+            <a:r>
+              <a:rPr lang="en-GB" dirty="0"/>
+              <a:t>h</a:t>
+            </a:r>
+            <a:r>
+              <a:rPr lang="en-150" dirty="0"/>
+              <a:t>e</a:t>
+            </a:r>
+            <a:r>
+              <a:rPr lang="en-GB" dirty="0"/>
+              <a:t>d</a:t>
+            </a:r>
+            <a:r>
+              <a:rPr lang="en-150" dirty="0"/>
+              <a:t>u</a:t>
+            </a:r>
+            <a:r>
+              <a:rPr lang="en-GB" dirty="0"/>
+              <a:t>l</a:t>
+            </a:r>
+            <a:r>
+              <a:rPr lang="en-150" dirty="0"/>
+              <a:t>e. </a:t>
+            </a:r>
+            <a:r>
+              <a:rPr lang="en-GB" dirty="0"/>
+              <a:t>I</a:t>
+            </a:r>
+            <a:r>
+              <a:rPr lang="en-150" dirty="0"/>
+              <a:t>f </a:t>
+            </a:r>
+            <a:r>
+              <a:rPr lang="en-GB" dirty="0"/>
+              <a:t>w</a:t>
+            </a:r>
+            <a:r>
+              <a:rPr lang="en-150" dirty="0"/>
+              <a:t>e </a:t>
+            </a:r>
+            <a:r>
+              <a:rPr lang="en-GB" dirty="0"/>
+              <a:t>w</a:t>
+            </a:r>
+            <a:r>
+              <a:rPr lang="en-150" dirty="0"/>
+              <a:t>ant to convert them to a gang task </a:t>
+            </a:r>
+            <a:r>
+              <a:rPr lang="en-GB" dirty="0"/>
+              <a:t>w</a:t>
+            </a:r>
+            <a:r>
+              <a:rPr lang="en-150" dirty="0"/>
+              <a:t>e </a:t>
+            </a:r>
+            <a:r>
+              <a:rPr lang="en-GB" dirty="0"/>
+              <a:t>w</a:t>
+            </a:r>
+            <a:r>
+              <a:rPr lang="en-150" dirty="0"/>
+              <a:t>o</a:t>
+            </a:r>
+            <a:r>
+              <a:rPr lang="en-GB" dirty="0"/>
+              <a:t>u</a:t>
+            </a:r>
+            <a:r>
+              <a:rPr lang="en-150" dirty="0"/>
+              <a:t>l</a:t>
+            </a:r>
+            <a:r>
+              <a:rPr lang="en-GB" dirty="0"/>
+              <a:t>d</a:t>
+            </a:r>
+            <a:r>
+              <a:rPr lang="en-150" dirty="0"/>
+              <a:t> </a:t>
+            </a:r>
+            <a:r>
+              <a:rPr lang="en-GB" dirty="0"/>
+              <a:t>p</a:t>
+            </a:r>
+            <a:r>
+              <a:rPr lang="en-150" dirty="0"/>
+              <a:t>u</a:t>
+            </a:r>
+            <a:r>
+              <a:rPr lang="en-GB" dirty="0"/>
+              <a:t>t</a:t>
+            </a:r>
+            <a:r>
+              <a:rPr lang="en-150" dirty="0"/>
+              <a:t> </a:t>
+            </a:r>
+            <a:r>
+              <a:rPr lang="en-GB" dirty="0"/>
+              <a:t>t</a:t>
+            </a:r>
+            <a:r>
+              <a:rPr lang="en-150" dirty="0"/>
+              <a:t>h</a:t>
+            </a:r>
+            <a:r>
+              <a:rPr lang="en-GB" dirty="0"/>
+              <a:t>e</a:t>
+            </a:r>
+            <a:r>
+              <a:rPr lang="en-150" dirty="0"/>
+              <a:t>m </a:t>
+            </a:r>
+            <a:r>
+              <a:rPr lang="en-GB" dirty="0"/>
+              <a:t>t</a:t>
+            </a:r>
+            <a:r>
+              <a:rPr lang="en-150" dirty="0"/>
+              <a:t>o</a:t>
+            </a:r>
+            <a:r>
+              <a:rPr lang="en-GB" dirty="0"/>
+              <a:t>g</a:t>
+            </a:r>
+            <a:r>
+              <a:rPr lang="en-150" dirty="0"/>
+              <a:t>e</a:t>
+            </a:r>
+            <a:r>
+              <a:rPr lang="en-GB" dirty="0"/>
+              <a:t>t</a:t>
+            </a:r>
+            <a:r>
+              <a:rPr lang="en-150" dirty="0"/>
+              <a:t>h</a:t>
+            </a:r>
+            <a:r>
+              <a:rPr lang="en-GB" dirty="0"/>
+              <a:t>e</a:t>
+            </a:r>
+            <a:r>
+              <a:rPr lang="en-150" dirty="0"/>
+              <a:t>r </a:t>
+            </a:r>
+            <a:r>
+              <a:rPr lang="en-GB" dirty="0"/>
+              <a:t>a</a:t>
+            </a:r>
+            <a:r>
+              <a:rPr lang="en-150" dirty="0"/>
+              <a:t>s </a:t>
+            </a:r>
+            <a:r>
+              <a:rPr lang="en-GB" dirty="0"/>
+              <a:t>a</a:t>
+            </a:r>
+            <a:r>
+              <a:rPr lang="en-150" dirty="0"/>
+              <a:t> “</a:t>
+            </a:r>
+            <a:r>
+              <a:rPr lang="en-GB" dirty="0"/>
+              <a:t>g</a:t>
+            </a:r>
+            <a:r>
+              <a:rPr lang="en-150" dirty="0"/>
+              <a:t>a</a:t>
+            </a:r>
+            <a:r>
+              <a:rPr lang="en-GB" dirty="0"/>
+              <a:t>n</a:t>
+            </a:r>
+            <a:r>
+              <a:rPr lang="en-150" dirty="0"/>
+              <a:t>g” &lt;</a:t>
+            </a:r>
+            <a:r>
+              <a:rPr lang="en-GB" dirty="0"/>
+              <a:t>c</a:t>
+            </a:r>
+            <a:r>
+              <a:rPr lang="en-150" dirty="0"/>
+              <a:t>l</a:t>
+            </a:r>
+            <a:r>
+              <a:rPr lang="en-GB" dirty="0"/>
+              <a:t>i</a:t>
+            </a:r>
+            <a:r>
+              <a:rPr lang="en-150" dirty="0"/>
+              <a:t>c</a:t>
+            </a:r>
+            <a:r>
+              <a:rPr lang="en-GB" dirty="0"/>
+              <a:t>k</a:t>
+            </a:r>
+            <a:r>
+              <a:rPr lang="en-150" dirty="0"/>
+              <a:t>&gt; </a:t>
+            </a:r>
+            <a:r>
+              <a:rPr lang="en-GB" dirty="0"/>
+              <a:t>a</a:t>
+            </a:r>
+            <a:r>
+              <a:rPr lang="en-150" dirty="0"/>
+              <a:t>n</a:t>
+            </a:r>
+            <a:r>
+              <a:rPr lang="en-GB" dirty="0"/>
+              <a:t>d</a:t>
+            </a:r>
+            <a:r>
+              <a:rPr lang="en-150" dirty="0"/>
+              <a:t> </a:t>
+            </a:r>
+            <a:r>
+              <a:rPr lang="en-GB" dirty="0"/>
+              <a:t>t</a:t>
+            </a:r>
+            <a:r>
+              <a:rPr lang="en-150" dirty="0"/>
+              <a:t>h</a:t>
+            </a:r>
+            <a:r>
+              <a:rPr lang="en-GB" dirty="0"/>
+              <a:t>e</a:t>
+            </a:r>
+            <a:r>
+              <a:rPr lang="en-150" dirty="0"/>
+              <a:t>n </a:t>
+            </a:r>
+            <a:r>
+              <a:rPr lang="en-GB" dirty="0"/>
+              <a:t>w</a:t>
+            </a:r>
+            <a:r>
+              <a:rPr lang="en-150" dirty="0"/>
+              <a:t>e </a:t>
+            </a:r>
+            <a:r>
+              <a:rPr lang="en-GB" dirty="0"/>
+              <a:t>w</a:t>
+            </a:r>
+            <a:r>
+              <a:rPr lang="en-150" dirty="0"/>
+              <a:t>o</a:t>
+            </a:r>
+            <a:r>
+              <a:rPr lang="en-GB" dirty="0"/>
+              <a:t>u</a:t>
+            </a:r>
+            <a:r>
+              <a:rPr lang="en-150" dirty="0"/>
+              <a:t>l</a:t>
+            </a:r>
+            <a:r>
+              <a:rPr lang="en-GB" dirty="0"/>
+              <a:t>d</a:t>
+            </a:r>
+            <a:r>
+              <a:rPr lang="en-150" dirty="0"/>
+              <a:t> </a:t>
+            </a:r>
+            <a:r>
+              <a:rPr lang="en-GB" dirty="0"/>
+              <a:t>s</a:t>
+            </a:r>
+            <a:r>
+              <a:rPr lang="en-150" dirty="0"/>
+              <a:t>c</a:t>
+            </a:r>
+            <a:r>
+              <a:rPr lang="en-GB" dirty="0"/>
+              <a:t>h</a:t>
+            </a:r>
+            <a:r>
+              <a:rPr lang="en-150" dirty="0"/>
+              <a:t>e</a:t>
+            </a:r>
+            <a:r>
+              <a:rPr lang="en-GB" dirty="0"/>
+              <a:t>d</a:t>
+            </a:r>
+            <a:r>
+              <a:rPr lang="en-150" dirty="0"/>
+              <a:t>u</a:t>
+            </a:r>
+            <a:r>
+              <a:rPr lang="en-GB" dirty="0"/>
+              <a:t>l</a:t>
+            </a:r>
+            <a:r>
+              <a:rPr lang="en-150" dirty="0"/>
+              <a:t>e </a:t>
+            </a:r>
+            <a:r>
+              <a:rPr lang="en-GB" dirty="0"/>
+              <a:t>a</a:t>
+            </a:r>
+            <a:r>
+              <a:rPr lang="en-150" dirty="0"/>
+              <a:t>s </a:t>
+            </a:r>
+            <a:r>
+              <a:rPr lang="en-GB" dirty="0"/>
+              <a:t>a</a:t>
+            </a:r>
+            <a:r>
+              <a:rPr lang="en-150" dirty="0"/>
+              <a:t> </a:t>
+            </a:r>
+            <a:r>
+              <a:rPr lang="en-GB" dirty="0"/>
+              <a:t>s</a:t>
+            </a:r>
+            <a:r>
+              <a:rPr lang="en-150" dirty="0"/>
+              <a:t>i</a:t>
+            </a:r>
+            <a:r>
+              <a:rPr lang="en-GB" dirty="0"/>
+              <a:t>n</a:t>
+            </a:r>
+            <a:r>
+              <a:rPr lang="en-150" dirty="0"/>
+              <a:t>g</a:t>
+            </a:r>
+            <a:r>
+              <a:rPr lang="en-GB" dirty="0"/>
+              <a:t>l</a:t>
+            </a:r>
+            <a:r>
+              <a:rPr lang="en-150" dirty="0"/>
+              <a:t>e </a:t>
+            </a:r>
+            <a:r>
+              <a:rPr lang="en-GB" dirty="0"/>
+              <a:t>t</a:t>
+            </a:r>
+            <a:r>
+              <a:rPr lang="en-150" dirty="0"/>
+              <a:t>a</a:t>
+            </a:r>
+            <a:r>
+              <a:rPr lang="en-GB" dirty="0"/>
+              <a:t>s</a:t>
+            </a:r>
+            <a:r>
+              <a:rPr lang="en-150" dirty="0"/>
+              <a:t>k&lt;</a:t>
+            </a:r>
+            <a:r>
+              <a:rPr lang="en-GB" dirty="0"/>
+              <a:t>c</a:t>
+            </a:r>
+            <a:r>
+              <a:rPr lang="en-150" dirty="0"/>
+              <a:t>l</a:t>
+            </a:r>
+            <a:r>
+              <a:rPr lang="en-GB" dirty="0"/>
+              <a:t>i</a:t>
+            </a:r>
+            <a:r>
+              <a:rPr lang="en-150" dirty="0"/>
+              <a:t>c</a:t>
+            </a:r>
+            <a:r>
+              <a:rPr lang="en-GB" dirty="0"/>
+              <a:t>k</a:t>
+            </a:r>
+            <a:r>
+              <a:rPr lang="en-150" dirty="0"/>
+              <a:t>&gt; so the execution would not start until there are enough free cores.</a:t>
+            </a:r>
+          </a:p>
+        </p:txBody>
+      </p:sp>
+      <p:sp>
+        <p:nvSpPr>
+          <p:cNvPr id="4" name="Slide Number Placeholder 3"/>
+          <p:cNvSpPr>
+            <a:spLocks noGrp="1"/>
+          </p:cNvSpPr>
+          <p:nvPr>
+            <p:ph type="sldNum" sz="quarter" idx="5"/>
+          </p:nvPr>
+        </p:nvSpPr>
+        <p:spPr/>
+        <p:txBody>
+          <a:bodyPr/>
+          <a:lstStyle/>
+          <a:p>
+            <a:fld id="{CCADCBAA-299B-4552-9387-24D12127C082}" type="slidenum">
+              <a:rPr lang="en-GB" smtClean="0"/>
+              <a:t>14</a:t>
+            </a:fld>
+            <a:endParaRPr lang="en-GB" dirty="0"/>
+          </a:p>
+        </p:txBody>
+      </p:sp>
+    </p:spTree>
+    <p:extLst>
+      <p:ext uri="{BB962C8B-B14F-4D97-AF65-F5344CB8AC3E}">
         <p14:creationId xmlns:p14="http://schemas.microsoft.com/office/powerpoint/2010/main" val="1346820878"/>
       </p:ext>
     </p:extLst>
@@ -3698,7 +4443,7 @@
           <a:p>
             <a:fld id="{E38A22E1-EB92-4D54-BACA-04AA8A92E613}" type="datetime1">
               <a:rPr lang="en-GB" smtClean="0"/>
-              <a:t>03/04/2020</a:t>
+              <a:t>06/04/2020</a:t>
             </a:fld>
             <a:endParaRPr lang="en-GB" dirty="0"/>
           </a:p>
@@ -3915,7 +4660,7 @@
           <a:p>
             <a:fld id="{F7BBACEA-79DB-4B06-B53C-1515C6E9AA2A}" type="datetime1">
               <a:rPr lang="en-GB" smtClean="0"/>
-              <a:t>03/04/2020</a:t>
+              <a:t>06/04/2020</a:t>
             </a:fld>
             <a:endParaRPr lang="en-GB" dirty="0"/>
           </a:p>
@@ -4125,7 +4870,7 @@
           <a:p>
             <a:fld id="{1242A314-3A0B-49C4-ADB0-F8BBA4139E56}" type="datetime1">
               <a:rPr lang="en-GB" smtClean="0"/>
-              <a:t>03/04/2020</a:t>
+              <a:t>06/04/2020</a:t>
             </a:fld>
             <a:endParaRPr lang="en-GB" dirty="0"/>
           </a:p>
@@ -4325,7 +5070,7 @@
           <a:p>
             <a:fld id="{D240987B-0079-4EE9-8A70-14597C3743BC}" type="datetime1">
               <a:rPr lang="en-GB" smtClean="0"/>
-              <a:t>03/04/2020</a:t>
+              <a:t>06/04/2020</a:t>
             </a:fld>
             <a:endParaRPr lang="en-GB" dirty="0"/>
           </a:p>
@@ -4601,7 +5346,7 @@
           <a:p>
             <a:fld id="{9C436FE2-9B88-4810-AC3E-E01CD02C2930}" type="datetime1">
               <a:rPr lang="en-GB" smtClean="0"/>
-              <a:t>03/04/2020</a:t>
+              <a:t>06/04/2020</a:t>
             </a:fld>
             <a:endParaRPr lang="en-GB" dirty="0"/>
           </a:p>
@@ -4869,7 +5614,7 @@
           <a:p>
             <a:fld id="{08368621-535E-44A6-A126-3F2534EA9A7B}" type="datetime1">
               <a:rPr lang="en-GB" smtClean="0"/>
-              <a:t>03/04/2020</a:t>
+              <a:t>06/04/2020</a:t>
             </a:fld>
             <a:endParaRPr lang="en-GB" dirty="0"/>
           </a:p>
@@ -5284,7 +6029,7 @@
           <a:p>
             <a:fld id="{632F5B32-CFB7-415D-9B96-9BE2AE3D1AAC}" type="datetime1">
               <a:rPr lang="en-GB" smtClean="0"/>
-              <a:t>03/04/2020</a:t>
+              <a:t>06/04/2020</a:t>
             </a:fld>
             <a:endParaRPr lang="en-GB" dirty="0"/>
           </a:p>
@@ -5426,7 +6171,7 @@
           <a:p>
             <a:fld id="{C2A51E27-F50C-4FD5-A040-64C12EA57AB4}" type="datetime1">
               <a:rPr lang="en-GB" smtClean="0"/>
-              <a:t>03/04/2020</a:t>
+              <a:t>06/04/2020</a:t>
             </a:fld>
             <a:endParaRPr lang="en-GB" dirty="0"/>
           </a:p>
@@ -5539,7 +6284,7 @@
           <a:p>
             <a:fld id="{A60DBC3F-8614-44B4-9683-36A45BFFB7A1}" type="datetime1">
               <a:rPr lang="en-GB" smtClean="0"/>
-              <a:t>03/04/2020</a:t>
+              <a:t>06/04/2020</a:t>
             </a:fld>
             <a:endParaRPr lang="en-GB" dirty="0"/>
           </a:p>
@@ -5852,7 +6597,7 @@
           <a:p>
             <a:fld id="{23091C06-D056-41B0-9F5F-5E90B83401B6}" type="datetime1">
               <a:rPr lang="en-GB" smtClean="0"/>
-              <a:t>03/04/2020</a:t>
+              <a:t>06/04/2020</a:t>
             </a:fld>
             <a:endParaRPr lang="en-GB" dirty="0"/>
           </a:p>
@@ -6145,7 +6890,7 @@
           <a:p>
             <a:fld id="{119BFB93-9673-43A0-BDFE-39DE919D7FF9}" type="datetime1">
               <a:rPr lang="en-GB" smtClean="0"/>
-              <a:t>03/04/2020</a:t>
+              <a:t>06/04/2020</a:t>
             </a:fld>
             <a:endParaRPr lang="en-GB" dirty="0"/>
           </a:p>
@@ -6443,7 +7188,7 @@
             <a:fld id="{1D06A54C-354E-461C-AA7A-CD74CDD91362}" type="datetime1">
               <a:rPr lang="en-GB" smtClean="0"/>
               <a:pPr/>
-              <a:t>03/04/2020</a:t>
+              <a:t>06/04/2020</a:t>
             </a:fld>
             <a:endParaRPr lang="en-GB" dirty="0"/>
           </a:p>
@@ -8414,36 +9159,39 @@
           <a:lstStyle/>
           <a:p>
             <a:r>
-              <a:rPr lang="en-GB" noProof="0" dirty="0"/>
-              <a:t>Run schedulability analysis with precedence constraints</a:t>
-            </a:r>
-          </a:p>
-          <a:p>
-            <a:r>
-              <a:rPr lang="en-GB" dirty="0"/>
-              <a:t>Implement precedence constraints in simulator</a:t>
+              <a:rPr lang="en-GB" dirty="0"/>
+              <a:t>Maybe we have too many task sets to evaluate, reduce some of the tests?</a:t>
+            </a:r>
+          </a:p>
+          <a:p>
+            <a:r>
+              <a:rPr lang="en-GB" dirty="0"/>
+              <a:t>Implement task with precedence constraints into simulator (90%)</a:t>
+            </a:r>
+          </a:p>
+          <a:p>
+            <a:r>
+              <a:rPr lang="en-GB" dirty="0"/>
+              <a:t>Test runs of tasks with precedence constraints into SAG</a:t>
             </a:r>
           </a:p>
           <a:p>
             <a:pPr lvl="1"/>
             <a:r>
-              <a:rPr lang="en-GB" noProof="0" dirty="0"/>
-              <a:t>Run simulator with precedence constraints</a:t>
-            </a:r>
-          </a:p>
-          <a:p>
-            <a:r>
-              <a:rPr lang="en-GB" noProof="0" dirty="0"/>
-              <a:t>Create task sets with precedence constraints and jitter</a:t>
-            </a:r>
+              <a:rPr lang="en-GB" dirty="0"/>
+              <a:t>Some bugs were found</a:t>
+            </a:r>
+          </a:p>
+          <a:p>
+            <a:pPr lvl="1"/>
+            <a:r>
+              <a:rPr lang="en-GB" dirty="0"/>
+              <a:t>Certainly running jobs set is a bit imprecise</a:t>
+            </a:r>
+          </a:p>
+          <a:p>
+            <a:pPr lvl="1"/>
             <a:endParaRPr lang="en-GB" dirty="0"/>
-          </a:p>
-          <a:p>
-            <a:pPr lvl="1"/>
-            <a:r>
-              <a:rPr lang="en-GB" noProof="0" dirty="0"/>
-              <a:t>Run them</a:t>
-            </a:r>
           </a:p>
         </p:txBody>
       </p:sp>
@@ -8469,8 +9217,72 @@
           <a:lstStyle/>
           <a:p>
             <a:r>
-              <a:rPr lang="en-GB" dirty="0"/>
-              <a:t>What’s next?</a:t>
+              <a:rPr lang="en-150" noProof="0" dirty="0"/>
+              <a:t>W</a:t>
+            </a:r>
+            <a:r>
+              <a:rPr lang="en-GB" noProof="0" dirty="0"/>
+              <a:t>h</a:t>
+            </a:r>
+            <a:r>
+              <a:rPr lang="en-150" noProof="0" dirty="0"/>
+              <a:t>a</a:t>
+            </a:r>
+            <a:r>
+              <a:rPr lang="en-GB" noProof="0" dirty="0"/>
+              <a:t>t</a:t>
+            </a:r>
+            <a:r>
+              <a:rPr lang="en-150" noProof="0" dirty="0"/>
+              <a:t> </a:t>
+            </a:r>
+            <a:r>
+              <a:rPr lang="en-GB" noProof="0" dirty="0"/>
+              <a:t>h</a:t>
+            </a:r>
+            <a:r>
+              <a:rPr lang="en-150" noProof="0" dirty="0"/>
+              <a:t>a</a:t>
+            </a:r>
+            <a:r>
+              <a:rPr lang="en-GB" noProof="0" dirty="0"/>
+              <a:t>s</a:t>
+            </a:r>
+            <a:r>
+              <a:rPr lang="en-150" noProof="0" dirty="0"/>
+              <a:t> </a:t>
+            </a:r>
+            <a:r>
+              <a:rPr lang="en-GB" noProof="0" dirty="0"/>
+              <a:t>b</a:t>
+            </a:r>
+            <a:r>
+              <a:rPr lang="en-150" noProof="0" dirty="0"/>
+              <a:t>e</a:t>
+            </a:r>
+            <a:r>
+              <a:rPr lang="en-GB" noProof="0" dirty="0"/>
+              <a:t>e</a:t>
+            </a:r>
+            <a:r>
+              <a:rPr lang="en-150" noProof="0" dirty="0"/>
+              <a:t>n </a:t>
+            </a:r>
+            <a:r>
+              <a:rPr lang="en-GB" noProof="0" dirty="0"/>
+              <a:t>d</a:t>
+            </a:r>
+            <a:r>
+              <a:rPr lang="en-150" noProof="0" dirty="0"/>
+              <a:t>o</a:t>
+            </a:r>
+            <a:r>
+              <a:rPr lang="en-GB" noProof="0" dirty="0"/>
+              <a:t>n</a:t>
+            </a:r>
+            <a:r>
+              <a:rPr lang="en-150" noProof="0" dirty="0"/>
+              <a:t>e?</a:t>
             </a:r>
             <a:endParaRPr lang="en-GB" noProof="0" dirty="0"/>
           </a:p>
@@ -8508,7 +9320,7 @@
     </p:spTree>
     <p:extLst>
       <p:ext uri="{BB962C8B-B14F-4D97-AF65-F5344CB8AC3E}">
-        <p14:creationId xmlns:p14="http://schemas.microsoft.com/office/powerpoint/2010/main" val="2525155807"/>
+        <p14:creationId xmlns:p14="http://schemas.microsoft.com/office/powerpoint/2010/main" val="3952049786"/>
       </p:ext>
     </p:extLst>
   </p:cSld>
@@ -8618,15 +9430,33 @@
                                   </p:childTnLst>
                                 </p:cTn>
                               </p:par>
+                            </p:childTnLst>
+                          </p:cTn>
+                        </p:par>
+                      </p:childTnLst>
+                    </p:cTn>
+                  </p:par>
+                  <p:par>
+                    <p:cTn id="11" fill="hold">
+                      <p:stCondLst>
+                        <p:cond delay="indefinite"/>
+                      </p:stCondLst>
+                      <p:childTnLst>
+                        <p:par>
+                          <p:cTn id="12" fill="hold">
+                            <p:stCondLst>
+                              <p:cond delay="0"/>
+                            </p:stCondLst>
+                            <p:childTnLst>
                               <p:par>
-                                <p:cTn id="11" presetID="1" presetClass="entr" presetSubtype="0" fill="hold" grpId="0" nodeType="withEffect">
+                                <p:cTn id="13" presetID="1" presetClass="entr" presetSubtype="0" fill="hold" grpId="0" nodeType="clickEffect">
                                   <p:stCondLst>
                                     <p:cond delay="0"/>
                                   </p:stCondLst>
                                   <p:childTnLst>
                                     <p:set>
                                       <p:cBhvr>
-                                        <p:cTn id="12" dur="1" fill="hold">
+                                        <p:cTn id="14" dur="1" fill="hold">
                                           <p:stCondLst>
                                             <p:cond delay="0"/>
                                           </p:stCondLst>
@@ -8649,26 +9479,8 @@
                                   </p:childTnLst>
                                 </p:cTn>
                               </p:par>
-                            </p:childTnLst>
-                          </p:cTn>
-                        </p:par>
-                      </p:childTnLst>
-                    </p:cTn>
-                  </p:par>
-                  <p:par>
-                    <p:cTn id="13" fill="hold">
-                      <p:stCondLst>
-                        <p:cond delay="indefinite"/>
-                      </p:stCondLst>
-                      <p:childTnLst>
-                        <p:par>
-                          <p:cTn id="14" fill="hold">
-                            <p:stCondLst>
-                              <p:cond delay="0"/>
-                            </p:stCondLst>
-                            <p:childTnLst>
                               <p:par>
-                                <p:cTn id="15" presetID="1" presetClass="entr" presetSubtype="0" fill="hold" grpId="0" nodeType="clickEffect">
+                                <p:cTn id="15" presetID="1" presetClass="entr" presetSubtype="0" fill="hold" grpId="0" nodeType="withEffect">
                                   <p:stCondLst>
                                     <p:cond delay="0"/>
                                   </p:stCondLst>
@@ -8715,6 +9527,1850 @@
                                           <p:spTgt spid="3">
                                             <p:txEl>
                                               <p:pRg st="4" end="4"/>
+                                            </p:txEl>
+                                          </p:spTgt>
+                                        </p:tgtEl>
+                                        <p:attrNameLst>
+                                          <p:attrName>style.visibility</p:attrName>
+                                        </p:attrNameLst>
+                                      </p:cBhvr>
+                                      <p:to>
+                                        <p:strVal val="visible"/>
+                                      </p:to>
+                                    </p:set>
+                                  </p:childTnLst>
+                                </p:cTn>
+                              </p:par>
+                            </p:childTnLst>
+                          </p:cTn>
+                        </p:par>
+                      </p:childTnLst>
+                    </p:cTn>
+                  </p:par>
+                </p:childTnLst>
+              </p:cTn>
+              <p:prevCondLst>
+                <p:cond evt="onPrev" delay="0">
+                  <p:tgtEl>
+                    <p:sldTgt/>
+                  </p:tgtEl>
+                </p:cond>
+              </p:prevCondLst>
+              <p:nextCondLst>
+                <p:cond evt="onNext" delay="0">
+                  <p:tgtEl>
+                    <p:sldTgt/>
+                  </p:tgtEl>
+                </p:cond>
+              </p:nextCondLst>
+            </p:seq>
+          </p:childTnLst>
+        </p:cTn>
+      </p:par>
+    </p:tnLst>
+    <p:bldLst>
+      <p:bldP spid="3" grpId="0" uiExpand="1" build="p"/>
+    </p:bldLst>
+  </p:timing>
+</p:sld>
+</file>
+
+<file path=ppt/slides/slide12.xml><?xml version="1.0" encoding="utf-8"?>
+<p:sld xmlns:a="http://schemas.openxmlformats.org/drawingml/2006/main" xmlns:r="http://schemas.openxmlformats.org/officeDocument/2006/relationships" xmlns:p="http://schemas.openxmlformats.org/presentationml/2006/main">
+  <p:cSld>
+    <p:spTree>
+      <p:nvGrpSpPr>
+        <p:cNvPr id="1" name=""/>
+        <p:cNvGrpSpPr/>
+        <p:nvPr/>
+      </p:nvGrpSpPr>
+      <p:grpSpPr>
+        <a:xfrm>
+          <a:off x="0" y="0"/>
+          <a:ext cx="0" cy="0"/>
+          <a:chOff x="0" y="0"/>
+          <a:chExt cx="0" cy="0"/>
+        </a:xfrm>
+      </p:grpSpPr>
+      <p:sp>
+        <p:nvSpPr>
+          <p:cNvPr id="2" name="Title 1">
+            <a:extLst>
+              <a:ext uri="{FF2B5EF4-FFF2-40B4-BE49-F238E27FC236}">
+                <a16:creationId xmlns:a16="http://schemas.microsoft.com/office/drawing/2014/main" id="{7B13750A-0837-45DC-A10E-F2A6B3AA52EA}"/>
+              </a:ext>
+            </a:extLst>
+          </p:cNvPr>
+          <p:cNvSpPr>
+            <a:spLocks noGrp="1"/>
+          </p:cNvSpPr>
+          <p:nvPr>
+            <p:ph type="title"/>
+          </p:nvPr>
+        </p:nvSpPr>
+        <p:spPr>
+          <a:xfrm>
+            <a:off x="838200" y="365126"/>
+            <a:ext cx="10515600" cy="1014788"/>
+          </a:xfrm>
+        </p:spPr>
+        <p:txBody>
+          <a:bodyPr anchor="ctr">
+            <a:normAutofit/>
+          </a:bodyPr>
+          <a:lstStyle/>
+          <a:p>
+            <a:r>
+              <a:rPr lang="en-GB" dirty="0"/>
+              <a:t>Certainly running jobs problems</a:t>
+            </a:r>
+          </a:p>
+        </p:txBody>
+      </p:sp>
+      <p:pic>
+        <p:nvPicPr>
+          <p:cNvPr id="6" name="Content Placeholder 5" descr="A screenshot of a cell phone&#10;&#10;Description automatically generated">
+            <a:extLst>
+              <a:ext uri="{FF2B5EF4-FFF2-40B4-BE49-F238E27FC236}">
+                <a16:creationId xmlns:a16="http://schemas.microsoft.com/office/drawing/2014/main" id="{DE073B64-DE0A-4980-89A4-8583ACCE5D56}"/>
+              </a:ext>
+            </a:extLst>
+          </p:cNvPr>
+          <p:cNvPicPr>
+            <a:picLocks noGrp="1" noChangeAspect="1"/>
+          </p:cNvPicPr>
+          <p:nvPr>
+            <p:ph idx="1"/>
+          </p:nvPr>
+        </p:nvPicPr>
+        <p:blipFill>
+          <a:blip r:embed="rId2">
+            <a:extLst>
+              <a:ext uri="{28A0092B-C50C-407E-A947-70E740481C1C}">
+                <a14:useLocalDpi xmlns:a14="http://schemas.microsoft.com/office/drawing/2010/main" val="0"/>
+              </a:ext>
+            </a:extLst>
+          </a:blip>
+          <a:stretch>
+            <a:fillRect/>
+          </a:stretch>
+        </p:blipFill>
+        <p:spPr>
+          <a:xfrm>
+            <a:off x="1544638" y="1520543"/>
+            <a:ext cx="10361071" cy="4481163"/>
+          </a:xfrm>
+          <a:noFill/>
+        </p:spPr>
+      </p:pic>
+      <p:sp>
+        <p:nvSpPr>
+          <p:cNvPr id="4" name="Slide Number Placeholder 3">
+            <a:extLst>
+              <a:ext uri="{FF2B5EF4-FFF2-40B4-BE49-F238E27FC236}">
+                <a16:creationId xmlns:a16="http://schemas.microsoft.com/office/drawing/2014/main" id="{B4D744D5-2813-4EF9-A905-C3862D1E3C83}"/>
+              </a:ext>
+            </a:extLst>
+          </p:cNvPr>
+          <p:cNvSpPr>
+            <a:spLocks noGrp="1"/>
+          </p:cNvSpPr>
+          <p:nvPr>
+            <p:ph type="sldNum" sz="quarter" idx="12"/>
+          </p:nvPr>
+        </p:nvSpPr>
+        <p:spPr>
+          <a:xfrm>
+            <a:off x="8610600" y="6356350"/>
+            <a:ext cx="2320636" cy="365125"/>
+          </a:xfrm>
+        </p:spPr>
+        <p:txBody>
+          <a:bodyPr anchor="ctr">
+            <a:normAutofit/>
+          </a:bodyPr>
+          <a:lstStyle/>
+          <a:p>
+            <a:pPr>
+              <a:spcAft>
+                <a:spcPts val="600"/>
+              </a:spcAft>
+            </a:pPr>
+            <a:fld id="{6565F0C3-D9E9-4961-A3A4-87F2116D4289}" type="slidenum">
+              <a:rPr lang="en-GB" smtClean="0"/>
+              <a:pPr>
+                <a:spcAft>
+                  <a:spcPts val="600"/>
+                </a:spcAft>
+              </a:pPr>
+              <a:t>12</a:t>
+            </a:fld>
+            <a:endParaRPr lang="en-GB"/>
+          </a:p>
+        </p:txBody>
+      </p:sp>
+      <mc:AlternateContent xmlns:mc="http://schemas.openxmlformats.org/markup-compatibility/2006">
+        <mc:Choice xmlns:a14="http://schemas.microsoft.com/office/drawing/2010/main" Requires="a14">
+          <p:sp>
+            <p:nvSpPr>
+              <p:cNvPr id="9" name="TextBox 8">
+                <a:extLst>
+                  <a:ext uri="{FF2B5EF4-FFF2-40B4-BE49-F238E27FC236}">
+                    <a16:creationId xmlns:a16="http://schemas.microsoft.com/office/drawing/2014/main" id="{82D6C666-686F-459C-87A8-E09B84C74E8A}"/>
+                  </a:ext>
+                </a:extLst>
+              </p:cNvPr>
+              <p:cNvSpPr txBox="1"/>
+              <p:nvPr/>
+            </p:nvSpPr>
+            <p:spPr>
+              <a:xfrm>
+                <a:off x="286291" y="2552285"/>
+                <a:ext cx="3614590" cy="731867"/>
+              </a:xfrm>
+              <a:prstGeom prst="rect">
+                <a:avLst/>
+              </a:prstGeom>
+              <a:noFill/>
+            </p:spPr>
+            <p:txBody>
+              <a:bodyPr wrap="square" rtlCol="0">
+                <a:spAutoFit/>
+              </a:bodyPr>
+              <a:lstStyle/>
+              <a:p>
+                <a14:m>
+                  <m:oMathPara xmlns:m="http://schemas.openxmlformats.org/officeDocument/2006/math">
+                    <m:oMathParaPr>
+                      <m:jc m:val="centerGroup"/>
+                    </m:oMathParaPr>
+                    <m:oMath xmlns:m="http://schemas.openxmlformats.org/officeDocument/2006/math">
+                      <m:sSub>
+                        <m:sSubPr>
+                          <m:ctrlPr>
+                            <a:rPr lang="en-GB" sz="1600" b="0" i="1" smtClean="0">
+                              <a:latin typeface="Cambria Math" panose="02040503050406030204" pitchFamily="18" charset="0"/>
+                            </a:rPr>
+                          </m:ctrlPr>
+                        </m:sSubPr>
+                        <m:e>
+                          <m:r>
+                            <a:rPr lang="en-GB" sz="1600" b="0" i="1" smtClean="0">
+                              <a:latin typeface="Cambria Math" panose="02040503050406030204" pitchFamily="18" charset="0"/>
+                            </a:rPr>
+                            <m:t>𝑚</m:t>
+                          </m:r>
+                        </m:e>
+                        <m:sub>
+                          <m:r>
+                            <a:rPr lang="en-GB" sz="1600" b="0" i="1" smtClean="0">
+                              <a:latin typeface="Cambria Math" panose="02040503050406030204" pitchFamily="18" charset="0"/>
+                            </a:rPr>
+                            <m:t>𝑝𝑟𝑒𝑑</m:t>
+                          </m:r>
+                        </m:sub>
+                      </m:sSub>
+                      <m:r>
+                        <a:rPr lang="en-GB" sz="1600" b="0" i="1" smtClean="0">
+                          <a:latin typeface="Cambria Math" panose="02040503050406030204" pitchFamily="18" charset="0"/>
+                        </a:rPr>
+                        <m:t>=</m:t>
+                      </m:r>
+                      <m:func>
+                        <m:funcPr>
+                          <m:ctrlPr>
+                            <a:rPr lang="en-GB" sz="1600" b="0" i="1" smtClean="0">
+                              <a:latin typeface="Cambria Math" panose="02040503050406030204" pitchFamily="18" charset="0"/>
+                            </a:rPr>
+                          </m:ctrlPr>
+                        </m:funcPr>
+                        <m:fName>
+                          <m:r>
+                            <m:rPr>
+                              <m:sty m:val="p"/>
+                            </m:rPr>
+                            <a:rPr lang="en-GB" sz="1600" b="0" i="0" smtClean="0">
+                              <a:latin typeface="Cambria Math" panose="02040503050406030204" pitchFamily="18" charset="0"/>
+                            </a:rPr>
+                            <m:t>max</m:t>
+                          </m:r>
+                        </m:fName>
+                        <m:e>
+                          <m:d>
+                            <m:dPr>
+                              <m:begChr m:val="{"/>
+                              <m:endChr m:val="}"/>
+                              <m:ctrlPr>
+                                <a:rPr lang="en-GB" sz="1600" b="0" i="1" smtClean="0">
+                                  <a:latin typeface="Cambria Math" panose="02040503050406030204" pitchFamily="18" charset="0"/>
+                                </a:rPr>
+                              </m:ctrlPr>
+                            </m:dPr>
+                            <m:e>
+                              <m:r>
+                                <a:rPr lang="en-GB" sz="1600" b="0" i="1" smtClean="0">
+                                  <a:latin typeface="Cambria Math" panose="02040503050406030204" pitchFamily="18" charset="0"/>
+                                </a:rPr>
+                                <m:t>𝑝</m:t>
+                              </m:r>
+                              <m:r>
+                                <a:rPr lang="en-GB" sz="1600" b="0" i="1" smtClean="0">
+                                  <a:latin typeface="Cambria Math" panose="02040503050406030204" pitchFamily="18" charset="0"/>
+                                </a:rPr>
+                                <m:t>, </m:t>
+                              </m:r>
+                              <m:nary>
+                                <m:naryPr>
+                                  <m:chr m:val="∑"/>
+                                  <m:supHide m:val="on"/>
+                                  <m:ctrlPr>
+                                    <a:rPr lang="en-GB" sz="1600" b="0" i="1" smtClean="0">
+                                      <a:latin typeface="Cambria Math" panose="02040503050406030204" pitchFamily="18" charset="0"/>
+                                    </a:rPr>
+                                  </m:ctrlPr>
+                                </m:naryPr>
+                                <m:sub>
+                                  <m:sSub>
+                                    <m:sSubPr>
+                                      <m:ctrlPr>
+                                        <a:rPr lang="en-GB" sz="1600" b="0" i="1" smtClean="0">
+                                          <a:latin typeface="Cambria Math" panose="02040503050406030204" pitchFamily="18" charset="0"/>
+                                        </a:rPr>
+                                      </m:ctrlPr>
+                                    </m:sSubPr>
+                                    <m:e>
+                                      <m:r>
+                                        <a:rPr lang="en-GB" sz="1600" b="0" i="1" smtClean="0">
+                                          <a:latin typeface="Cambria Math" panose="02040503050406030204" pitchFamily="18" charset="0"/>
+                                        </a:rPr>
+                                        <m:t>𝐽</m:t>
+                                      </m:r>
+                                    </m:e>
+                                    <m:sub>
+                                      <m:r>
+                                        <a:rPr lang="en-GB" sz="1600" b="0" i="1" smtClean="0">
+                                          <a:latin typeface="Cambria Math" panose="02040503050406030204" pitchFamily="18" charset="0"/>
+                                        </a:rPr>
+                                        <m:t>𝑥</m:t>
+                                      </m:r>
+                                    </m:sub>
+                                  </m:sSub>
+                                  <m:r>
+                                    <a:rPr lang="en-GB" sz="1600" b="0" i="1" smtClean="0">
+                                      <a:latin typeface="Cambria Math" panose="02040503050406030204" pitchFamily="18" charset="0"/>
+                                    </a:rPr>
+                                    <m:t>∈</m:t>
+                                  </m:r>
+                                  <m:d>
+                                    <m:dPr>
+                                      <m:begChr m:val="{"/>
+                                      <m:endChr m:val="}"/>
+                                      <m:ctrlPr>
+                                        <a:rPr lang="en-GB" sz="1600" b="0" i="1" smtClean="0">
+                                          <a:latin typeface="Cambria Math" panose="02040503050406030204" pitchFamily="18" charset="0"/>
+                                        </a:rPr>
+                                      </m:ctrlPr>
+                                    </m:dPr>
+                                    <m:e>
+                                      <m:r>
+                                        <a:rPr lang="en-GB" sz="1600" b="0" i="1" smtClean="0">
+                                          <a:latin typeface="Cambria Math" panose="02040503050406030204" pitchFamily="18" charset="0"/>
+                                        </a:rPr>
+                                        <m:t>𝒳</m:t>
+                                      </m:r>
+                                      <m:d>
+                                        <m:dPr>
+                                          <m:ctrlPr>
+                                            <a:rPr lang="en-GB" sz="1600" b="0" i="1" smtClean="0">
+                                              <a:latin typeface="Cambria Math" panose="02040503050406030204" pitchFamily="18" charset="0"/>
+                                            </a:rPr>
+                                          </m:ctrlPr>
+                                        </m:dPr>
+                                        <m:e>
+                                          <m:r>
+                                            <a:rPr lang="en-GB" sz="1600" b="0" i="1" smtClean="0">
+                                              <a:latin typeface="Cambria Math" panose="02040503050406030204" pitchFamily="18" charset="0"/>
+                                            </a:rPr>
+                                            <m:t>𝑣</m:t>
+                                          </m:r>
+                                        </m:e>
+                                      </m:d>
+                                      <m:r>
+                                        <a:rPr lang="en-GB" sz="1600" b="0" i="1" smtClean="0">
+                                          <a:latin typeface="Cambria Math" panose="02040503050406030204" pitchFamily="18" charset="0"/>
+                                        </a:rPr>
+                                        <m:t>∩</m:t>
+                                      </m:r>
+                                      <m:r>
+                                        <a:rPr lang="en-GB" sz="1600" b="0" i="1" smtClean="0">
+                                          <a:latin typeface="Cambria Math" panose="02040503050406030204" pitchFamily="18" charset="0"/>
+                                        </a:rPr>
+                                        <m:t>𝒫</m:t>
+                                      </m:r>
+                                      <m:d>
+                                        <m:dPr>
+                                          <m:ctrlPr>
+                                            <a:rPr lang="en-GB" sz="1600" b="0" i="1" smtClean="0">
+                                              <a:latin typeface="Cambria Math" panose="02040503050406030204" pitchFamily="18" charset="0"/>
+                                            </a:rPr>
+                                          </m:ctrlPr>
+                                        </m:dPr>
+                                        <m:e>
+                                          <m:sSub>
+                                            <m:sSubPr>
+                                              <m:ctrlPr>
+                                                <a:rPr lang="en-GB" sz="1600" b="0" i="1" smtClean="0">
+                                                  <a:latin typeface="Cambria Math" panose="02040503050406030204" pitchFamily="18" charset="0"/>
+                                                </a:rPr>
+                                              </m:ctrlPr>
+                                            </m:sSubPr>
+                                            <m:e>
+                                              <m:r>
+                                                <a:rPr lang="en-GB" sz="1600" b="0" i="1" smtClean="0">
+                                                  <a:latin typeface="Cambria Math" panose="02040503050406030204" pitchFamily="18" charset="0"/>
+                                                </a:rPr>
+                                                <m:t>𝐽</m:t>
+                                              </m:r>
+                                            </m:e>
+                                            <m:sub>
+                                              <m:r>
+                                                <a:rPr lang="en-GB" sz="1600" b="0" i="1" smtClean="0">
+                                                  <a:latin typeface="Cambria Math" panose="02040503050406030204" pitchFamily="18" charset="0"/>
+                                                </a:rPr>
+                                                <m:t>𝑖</m:t>
+                                              </m:r>
+                                            </m:sub>
+                                          </m:sSub>
+                                        </m:e>
+                                      </m:d>
+                                    </m:e>
+                                  </m:d>
+                                </m:sub>
+                                <m:sup/>
+                                <m:e>
+                                  <m:sSub>
+                                    <m:sSubPr>
+                                      <m:ctrlPr>
+                                        <a:rPr lang="en-GB" sz="1600" b="0" i="1" smtClean="0">
+                                          <a:latin typeface="Cambria Math" panose="02040503050406030204" pitchFamily="18" charset="0"/>
+                                        </a:rPr>
+                                      </m:ctrlPr>
+                                    </m:sSubPr>
+                                    <m:e>
+                                      <m:r>
+                                        <a:rPr lang="en-GB" sz="1600" b="0" i="1" smtClean="0">
+                                          <a:latin typeface="Cambria Math" panose="02040503050406030204" pitchFamily="18" charset="0"/>
+                                        </a:rPr>
+                                        <m:t>𝑝</m:t>
+                                      </m:r>
+                                    </m:e>
+                                    <m:sub>
+                                      <m:r>
+                                        <a:rPr lang="en-GB" sz="1600" b="0" i="1" smtClean="0">
+                                          <a:latin typeface="Cambria Math" panose="02040503050406030204" pitchFamily="18" charset="0"/>
+                                        </a:rPr>
+                                        <m:t>𝑥</m:t>
+                                      </m:r>
+                                    </m:sub>
+                                  </m:sSub>
+                                  <m:d>
+                                    <m:dPr>
+                                      <m:ctrlPr>
+                                        <a:rPr lang="en-GB" sz="1600" b="0" i="1" smtClean="0">
+                                          <a:latin typeface="Cambria Math" panose="02040503050406030204" pitchFamily="18" charset="0"/>
+                                        </a:rPr>
+                                      </m:ctrlPr>
+                                    </m:dPr>
+                                    <m:e>
+                                      <m:r>
+                                        <a:rPr lang="en-GB" sz="1600" b="0" i="1" smtClean="0">
+                                          <a:latin typeface="Cambria Math" panose="02040503050406030204" pitchFamily="18" charset="0"/>
+                                        </a:rPr>
+                                        <m:t>𝑣</m:t>
+                                      </m:r>
+                                    </m:e>
+                                  </m:d>
+                                </m:e>
+                              </m:nary>
+                            </m:e>
+                          </m:d>
+                        </m:e>
+                      </m:func>
+                      <m:r>
+                        <a:rPr lang="en-GB" sz="1600" b="0" i="1" smtClean="0">
+                          <a:latin typeface="Cambria Math" panose="02040503050406030204" pitchFamily="18" charset="0"/>
+                        </a:rPr>
+                        <m:t> </m:t>
+                      </m:r>
+                    </m:oMath>
+                  </m:oMathPara>
+                </a14:m>
+                <a:endParaRPr lang="en-GB" sz="1600" dirty="0"/>
+              </a:p>
+            </p:txBody>
+          </p:sp>
+        </mc:Choice>
+        <mc:Fallback>
+          <p:sp>
+            <p:nvSpPr>
+              <p:cNvPr id="9" name="TextBox 8">
+                <a:extLst>
+                  <a:ext uri="{FF2B5EF4-FFF2-40B4-BE49-F238E27FC236}">
+                    <a16:creationId xmlns:a16="http://schemas.microsoft.com/office/drawing/2014/main" id="{82D6C666-686F-459C-87A8-E09B84C74E8A}"/>
+                  </a:ext>
+                </a:extLst>
+              </p:cNvPr>
+              <p:cNvSpPr txBox="1">
+                <a:spLocks noRot="1" noChangeAspect="1" noMove="1" noResize="1" noEditPoints="1" noAdjustHandles="1" noChangeArrowheads="1" noChangeShapeType="1" noTextEdit="1"/>
+              </p:cNvSpPr>
+              <p:nvPr/>
+            </p:nvSpPr>
+            <p:spPr>
+              <a:xfrm>
+                <a:off x="286291" y="2552285"/>
+                <a:ext cx="3614590" cy="731867"/>
+              </a:xfrm>
+              <a:prstGeom prst="rect">
+                <a:avLst/>
+              </a:prstGeom>
+              <a:blipFill>
+                <a:blip r:embed="rId3"/>
+                <a:stretch>
+                  <a:fillRect/>
+                </a:stretch>
+              </a:blipFill>
+            </p:spPr>
+            <p:txBody>
+              <a:bodyPr/>
+              <a:lstStyle/>
+              <a:p>
+                <a:r>
+                  <a:rPr lang="en-GB">
+                    <a:noFill/>
+                  </a:rPr>
+                  <a:t> </a:t>
+                </a:r>
+              </a:p>
+            </p:txBody>
+          </p:sp>
+        </mc:Fallback>
+      </mc:AlternateContent>
+      <mc:AlternateContent xmlns:mc="http://schemas.openxmlformats.org/markup-compatibility/2006">
+        <mc:Choice xmlns:a14="http://schemas.microsoft.com/office/drawing/2010/main" Requires="a14">
+          <p:sp>
+            <p:nvSpPr>
+              <p:cNvPr id="12" name="TextBox 11">
+                <a:extLst>
+                  <a:ext uri="{FF2B5EF4-FFF2-40B4-BE49-F238E27FC236}">
+                    <a16:creationId xmlns:a16="http://schemas.microsoft.com/office/drawing/2014/main" id="{C6322923-884D-4169-AE97-1006F6FE1E82}"/>
+                  </a:ext>
+                </a:extLst>
+              </p:cNvPr>
+              <p:cNvSpPr txBox="1"/>
+              <p:nvPr/>
+            </p:nvSpPr>
+            <p:spPr>
+              <a:xfrm>
+                <a:off x="286291" y="3643065"/>
+                <a:ext cx="4520601" cy="784702"/>
+              </a:xfrm>
+              <a:prstGeom prst="rect">
+                <a:avLst/>
+              </a:prstGeom>
+              <a:noFill/>
+            </p:spPr>
+            <p:txBody>
+              <a:bodyPr wrap="square" rtlCol="0">
+                <a:spAutoFit/>
+              </a:bodyPr>
+              <a:lstStyle/>
+              <a:p>
+                <a14:m>
+                  <m:oMathPara xmlns:m="http://schemas.openxmlformats.org/officeDocument/2006/math">
+                    <m:oMathParaPr>
+                      <m:jc m:val="centerGroup"/>
+                    </m:oMathParaPr>
+                    <m:oMath xmlns:m="http://schemas.openxmlformats.org/officeDocument/2006/math">
+                      <m:sSub>
+                        <m:sSubPr>
+                          <m:ctrlPr>
+                            <a:rPr lang="en-GB" sz="1600" b="0" i="1" smtClean="0">
+                              <a:latin typeface="Cambria Math" panose="02040503050406030204" pitchFamily="18" charset="0"/>
+                            </a:rPr>
+                          </m:ctrlPr>
+                        </m:sSubPr>
+                        <m:e>
+                          <m:r>
+                            <a:rPr lang="en-GB" sz="1600" b="0" i="1" smtClean="0">
+                              <a:latin typeface="Cambria Math" panose="02040503050406030204" pitchFamily="18" charset="0"/>
+                            </a:rPr>
+                            <m:t>𝑚</m:t>
+                          </m:r>
+                        </m:e>
+                        <m:sub>
+                          <m:r>
+                            <a:rPr lang="en-GB" sz="1600" b="0" i="1" smtClean="0">
+                              <a:latin typeface="Cambria Math" panose="02040503050406030204" pitchFamily="18" charset="0"/>
+                            </a:rPr>
+                            <m:t>𝑝𝑟𝑒𝑑</m:t>
+                          </m:r>
+                        </m:sub>
+                      </m:sSub>
+                      <m:r>
+                        <a:rPr lang="en-GB" sz="1600" b="0" i="1" smtClean="0">
+                          <a:latin typeface="Cambria Math" panose="02040503050406030204" pitchFamily="18" charset="0"/>
+                        </a:rPr>
+                        <m:t>=</m:t>
+                      </m:r>
+                      <m:func>
+                        <m:funcPr>
+                          <m:ctrlPr>
+                            <a:rPr lang="en-GB" sz="1600" b="0" i="1" smtClean="0">
+                              <a:latin typeface="Cambria Math" panose="02040503050406030204" pitchFamily="18" charset="0"/>
+                            </a:rPr>
+                          </m:ctrlPr>
+                        </m:funcPr>
+                        <m:fName>
+                          <m:r>
+                            <m:rPr>
+                              <m:sty m:val="p"/>
+                            </m:rPr>
+                            <a:rPr lang="en-GB" sz="1600" b="0" i="0" smtClean="0">
+                              <a:latin typeface="Cambria Math" panose="02040503050406030204" pitchFamily="18" charset="0"/>
+                            </a:rPr>
+                            <m:t>max</m:t>
+                          </m:r>
+                        </m:fName>
+                        <m:e>
+                          <m:d>
+                            <m:dPr>
+                              <m:begChr m:val="{"/>
+                              <m:endChr m:val="}"/>
+                              <m:ctrlPr>
+                                <a:rPr lang="en-GB" sz="1600" b="0" i="1" smtClean="0">
+                                  <a:latin typeface="Cambria Math" panose="02040503050406030204" pitchFamily="18" charset="0"/>
+                                </a:rPr>
+                              </m:ctrlPr>
+                            </m:dPr>
+                            <m:e>
+                              <m:r>
+                                <a:rPr lang="en-GB" sz="1600" b="0" i="1" smtClean="0">
+                                  <a:latin typeface="Cambria Math" panose="02040503050406030204" pitchFamily="18" charset="0"/>
+                                </a:rPr>
+                                <m:t>𝑝</m:t>
+                              </m:r>
+                              <m:r>
+                                <a:rPr lang="en-GB" sz="1600" b="0" i="1" smtClean="0">
+                                  <a:latin typeface="Cambria Math" panose="02040503050406030204" pitchFamily="18" charset="0"/>
+                                </a:rPr>
+                                <m:t>, </m:t>
+                              </m:r>
+                              <m:nary>
+                                <m:naryPr>
+                                  <m:chr m:val="∑"/>
+                                  <m:supHide m:val="on"/>
+                                  <m:ctrlPr>
+                                    <a:rPr lang="en-GB" sz="1600" b="0" i="1" smtClean="0">
+                                      <a:latin typeface="Cambria Math" panose="02040503050406030204" pitchFamily="18" charset="0"/>
+                                    </a:rPr>
+                                  </m:ctrlPr>
+                                </m:naryPr>
+                                <m:sub>
+                                  <m:sSub>
+                                    <m:sSubPr>
+                                      <m:ctrlPr>
+                                        <a:rPr lang="en-GB" sz="1600" b="0" i="1" smtClean="0">
+                                          <a:latin typeface="Cambria Math" panose="02040503050406030204" pitchFamily="18" charset="0"/>
+                                        </a:rPr>
+                                      </m:ctrlPr>
+                                    </m:sSubPr>
+                                    <m:e>
+                                      <m:r>
+                                        <a:rPr lang="en-GB" sz="1600" b="0" i="1" smtClean="0">
+                                          <a:latin typeface="Cambria Math" panose="02040503050406030204" pitchFamily="18" charset="0"/>
+                                        </a:rPr>
+                                        <m:t>𝐽</m:t>
+                                      </m:r>
+                                    </m:e>
+                                    <m:sub>
+                                      <m:r>
+                                        <a:rPr lang="en-GB" sz="1600" b="0" i="1" smtClean="0">
+                                          <a:latin typeface="Cambria Math" panose="02040503050406030204" pitchFamily="18" charset="0"/>
+                                        </a:rPr>
+                                        <m:t>𝑥</m:t>
+                                      </m:r>
+                                    </m:sub>
+                                  </m:sSub>
+                                  <m:r>
+                                    <a:rPr lang="en-GB" sz="1600" b="0" i="1" smtClean="0">
+                                      <a:latin typeface="Cambria Math" panose="02040503050406030204" pitchFamily="18" charset="0"/>
+                                    </a:rPr>
+                                    <m:t>∈</m:t>
+                                  </m:r>
+                                  <m:d>
+                                    <m:dPr>
+                                      <m:begChr m:val="{"/>
+                                      <m:endChr m:val="}"/>
+                                      <m:ctrlPr>
+                                        <a:rPr lang="en-GB" sz="1600" b="0" i="1" smtClean="0">
+                                          <a:latin typeface="Cambria Math" panose="02040503050406030204" pitchFamily="18" charset="0"/>
+                                        </a:rPr>
+                                      </m:ctrlPr>
+                                    </m:dPr>
+                                    <m:e>
+                                      <m:r>
+                                        <a:rPr lang="en-GB" sz="1600" b="0" i="1" smtClean="0">
+                                          <a:latin typeface="Cambria Math" panose="02040503050406030204" pitchFamily="18" charset="0"/>
+                                        </a:rPr>
+                                        <m:t>𝒳</m:t>
+                                      </m:r>
+                                      <m:d>
+                                        <m:dPr>
+                                          <m:ctrlPr>
+                                            <a:rPr lang="en-GB" sz="1600" b="0" i="1" smtClean="0">
+                                              <a:latin typeface="Cambria Math" panose="02040503050406030204" pitchFamily="18" charset="0"/>
+                                            </a:rPr>
+                                          </m:ctrlPr>
+                                        </m:dPr>
+                                        <m:e>
+                                          <m:r>
+                                            <a:rPr lang="en-GB" sz="1600" b="0" i="1" smtClean="0">
+                                              <a:latin typeface="Cambria Math" panose="02040503050406030204" pitchFamily="18" charset="0"/>
+                                            </a:rPr>
+                                            <m:t>𝑣</m:t>
+                                          </m:r>
+                                        </m:e>
+                                      </m:d>
+                                      <m:r>
+                                        <a:rPr lang="en-GB" sz="1600" b="0" i="1" smtClean="0">
+                                          <a:latin typeface="Cambria Math" panose="02040503050406030204" pitchFamily="18" charset="0"/>
+                                        </a:rPr>
+                                        <m:t>∩</m:t>
+                                      </m:r>
+                                      <m:r>
+                                        <a:rPr lang="en-GB" sz="1600" b="0" i="1" smtClean="0">
+                                          <a:latin typeface="Cambria Math" panose="02040503050406030204" pitchFamily="18" charset="0"/>
+                                        </a:rPr>
+                                        <m:t>𝒫</m:t>
+                                      </m:r>
+                                      <m:d>
+                                        <m:dPr>
+                                          <m:ctrlPr>
+                                            <a:rPr lang="en-GB" sz="1600" b="0" i="1" smtClean="0">
+                                              <a:latin typeface="Cambria Math" panose="02040503050406030204" pitchFamily="18" charset="0"/>
+                                            </a:rPr>
+                                          </m:ctrlPr>
+                                        </m:dPr>
+                                        <m:e>
+                                          <m:sSub>
+                                            <m:sSubPr>
+                                              <m:ctrlPr>
+                                                <a:rPr lang="en-GB" sz="1600" b="0" i="1" smtClean="0">
+                                                  <a:latin typeface="Cambria Math" panose="02040503050406030204" pitchFamily="18" charset="0"/>
+                                                </a:rPr>
+                                              </m:ctrlPr>
+                                            </m:sSubPr>
+                                            <m:e>
+                                              <m:r>
+                                                <a:rPr lang="en-GB" sz="1600" b="0" i="1" smtClean="0">
+                                                  <a:latin typeface="Cambria Math" panose="02040503050406030204" pitchFamily="18" charset="0"/>
+                                                </a:rPr>
+                                                <m:t>𝐽</m:t>
+                                              </m:r>
+                                            </m:e>
+                                            <m:sub>
+                                              <m:r>
+                                                <a:rPr lang="en-GB" sz="1600" b="0" i="1" smtClean="0">
+                                                  <a:latin typeface="Cambria Math" panose="02040503050406030204" pitchFamily="18" charset="0"/>
+                                                </a:rPr>
+                                                <m:t>𝑖</m:t>
+                                              </m:r>
+                                            </m:sub>
+                                          </m:sSub>
+                                        </m:e>
+                                      </m:d>
+                                    </m:e>
+                                  </m:d>
+                                  <m:r>
+                                    <a:rPr lang="en-GB" sz="1600" b="0" i="1" smtClean="0">
+                                      <a:latin typeface="Cambria Math" panose="02040503050406030204" pitchFamily="18" charset="0"/>
+                                    </a:rPr>
+                                    <m:t> ∧</m:t>
+                                  </m:r>
+                                  <m:d>
+                                    <m:dPr>
+                                      <m:ctrlPr>
+                                        <a:rPr lang="en-GB" sz="1600" b="0" i="1" smtClean="0">
+                                          <a:latin typeface="Cambria Math" panose="02040503050406030204" pitchFamily="18" charset="0"/>
+                                        </a:rPr>
+                                      </m:ctrlPr>
+                                    </m:dPr>
+                                    <m:e>
+                                      <m:r>
+                                        <a:rPr lang="en-GB" sz="1600" b="0" i="1" smtClean="0">
+                                          <a:latin typeface="Cambria Math" panose="02040503050406030204" pitchFamily="18" charset="0"/>
+                                        </a:rPr>
+                                        <m:t>𝐿𝑆</m:t>
+                                      </m:r>
+                                      <m:sSubSup>
+                                        <m:sSubSupPr>
+                                          <m:ctrlPr>
+                                            <a:rPr lang="en-GB" sz="1600" b="0" i="1" smtClean="0">
+                                              <a:latin typeface="Cambria Math" panose="02040503050406030204" pitchFamily="18" charset="0"/>
+                                            </a:rPr>
+                                          </m:ctrlPr>
+                                        </m:sSubSupPr>
+                                        <m:e>
+                                          <m:r>
+                                            <a:rPr lang="en-GB" sz="1600" b="0" i="1" smtClean="0">
+                                              <a:latin typeface="Cambria Math" panose="02040503050406030204" pitchFamily="18" charset="0"/>
+                                            </a:rPr>
+                                            <m:t>𝑇</m:t>
+                                          </m:r>
+                                        </m:e>
+                                        <m:sub>
+                                          <m:r>
+                                            <a:rPr lang="en-GB" sz="1600" b="0" i="1" smtClean="0">
+                                              <a:latin typeface="Cambria Math" panose="02040503050406030204" pitchFamily="18" charset="0"/>
+                                            </a:rPr>
+                                            <m:t>𝑖</m:t>
+                                          </m:r>
+                                        </m:sub>
+                                        <m:sup>
+                                          <m:r>
+                                            <a:rPr lang="en-GB" sz="1600" b="0" i="1" smtClean="0">
+                                              <a:latin typeface="Cambria Math" panose="02040503050406030204" pitchFamily="18" charset="0"/>
+                                            </a:rPr>
+                                            <m:t>𝑝</m:t>
+                                          </m:r>
+                                        </m:sup>
+                                      </m:sSubSup>
+                                      <m:r>
+                                        <a:rPr lang="en-GB" sz="1600" b="0" i="1" smtClean="0">
+                                          <a:latin typeface="Cambria Math" panose="02040503050406030204" pitchFamily="18" charset="0"/>
+                                        </a:rPr>
+                                        <m:t>&lt;</m:t>
+                                      </m:r>
+                                      <m:r>
+                                        <a:rPr lang="en-GB" sz="1600" b="0" i="1" smtClean="0">
+                                          <a:latin typeface="Cambria Math" panose="02040503050406030204" pitchFamily="18" charset="0"/>
+                                        </a:rPr>
+                                        <m:t>𝐿𝐹</m:t>
+                                      </m:r>
+                                      <m:sSub>
+                                        <m:sSubPr>
+                                          <m:ctrlPr>
+                                            <a:rPr lang="en-GB" sz="1600" b="0" i="1" smtClean="0">
+                                              <a:latin typeface="Cambria Math" panose="02040503050406030204" pitchFamily="18" charset="0"/>
+                                            </a:rPr>
+                                          </m:ctrlPr>
+                                        </m:sSubPr>
+                                        <m:e>
+                                          <m:r>
+                                            <a:rPr lang="en-GB" sz="1600" b="0" i="1" smtClean="0">
+                                              <a:latin typeface="Cambria Math" panose="02040503050406030204" pitchFamily="18" charset="0"/>
+                                            </a:rPr>
+                                            <m:t>𝑇</m:t>
+                                          </m:r>
+                                        </m:e>
+                                        <m:sub>
+                                          <m:r>
+                                            <a:rPr lang="en-GB" sz="1600" b="0" i="1" smtClean="0">
+                                              <a:latin typeface="Cambria Math" panose="02040503050406030204" pitchFamily="18" charset="0"/>
+                                            </a:rPr>
+                                            <m:t>𝑥</m:t>
+                                          </m:r>
+                                        </m:sub>
+                                      </m:sSub>
+                                    </m:e>
+                                  </m:d>
+                                </m:sub>
+                                <m:sup/>
+                                <m:e>
+                                  <m:sSub>
+                                    <m:sSubPr>
+                                      <m:ctrlPr>
+                                        <a:rPr lang="en-GB" sz="1600" b="0" i="1" smtClean="0">
+                                          <a:latin typeface="Cambria Math" panose="02040503050406030204" pitchFamily="18" charset="0"/>
+                                        </a:rPr>
+                                      </m:ctrlPr>
+                                    </m:sSubPr>
+                                    <m:e>
+                                      <m:r>
+                                        <a:rPr lang="en-GB" sz="1600" b="0" i="1" smtClean="0">
+                                          <a:latin typeface="Cambria Math" panose="02040503050406030204" pitchFamily="18" charset="0"/>
+                                        </a:rPr>
+                                        <m:t>𝑝</m:t>
+                                      </m:r>
+                                    </m:e>
+                                    <m:sub>
+                                      <m:r>
+                                        <a:rPr lang="en-GB" sz="1600" b="0" i="1" smtClean="0">
+                                          <a:latin typeface="Cambria Math" panose="02040503050406030204" pitchFamily="18" charset="0"/>
+                                        </a:rPr>
+                                        <m:t>𝑥</m:t>
+                                      </m:r>
+                                    </m:sub>
+                                  </m:sSub>
+                                  <m:d>
+                                    <m:dPr>
+                                      <m:ctrlPr>
+                                        <a:rPr lang="en-GB" sz="1600" b="0" i="1" smtClean="0">
+                                          <a:latin typeface="Cambria Math" panose="02040503050406030204" pitchFamily="18" charset="0"/>
+                                        </a:rPr>
+                                      </m:ctrlPr>
+                                    </m:dPr>
+                                    <m:e>
+                                      <m:r>
+                                        <a:rPr lang="en-GB" sz="1600" b="0" i="1" smtClean="0">
+                                          <a:latin typeface="Cambria Math" panose="02040503050406030204" pitchFamily="18" charset="0"/>
+                                        </a:rPr>
+                                        <m:t>𝑣</m:t>
+                                      </m:r>
+                                    </m:e>
+                                  </m:d>
+                                </m:e>
+                              </m:nary>
+                            </m:e>
+                          </m:d>
+                        </m:e>
+                      </m:func>
+                      <m:r>
+                        <a:rPr lang="en-GB" sz="1600" b="0" i="1" smtClean="0">
+                          <a:latin typeface="Cambria Math" panose="02040503050406030204" pitchFamily="18" charset="0"/>
+                        </a:rPr>
+                        <m:t> </m:t>
+                      </m:r>
+                    </m:oMath>
+                  </m:oMathPara>
+                </a14:m>
+                <a:endParaRPr lang="en-GB" sz="1600" dirty="0"/>
+              </a:p>
+            </p:txBody>
+          </p:sp>
+        </mc:Choice>
+        <mc:Fallback>
+          <p:sp>
+            <p:nvSpPr>
+              <p:cNvPr id="12" name="TextBox 11">
+                <a:extLst>
+                  <a:ext uri="{FF2B5EF4-FFF2-40B4-BE49-F238E27FC236}">
+                    <a16:creationId xmlns:a16="http://schemas.microsoft.com/office/drawing/2014/main" id="{C6322923-884D-4169-AE97-1006F6FE1E82}"/>
+                  </a:ext>
+                </a:extLst>
+              </p:cNvPr>
+              <p:cNvSpPr txBox="1">
+                <a:spLocks noRot="1" noChangeAspect="1" noMove="1" noResize="1" noEditPoints="1" noAdjustHandles="1" noChangeArrowheads="1" noChangeShapeType="1" noTextEdit="1"/>
+              </p:cNvSpPr>
+              <p:nvPr/>
+            </p:nvSpPr>
+            <p:spPr>
+              <a:xfrm>
+                <a:off x="286291" y="3643065"/>
+                <a:ext cx="4520601" cy="784702"/>
+              </a:xfrm>
+              <a:prstGeom prst="rect">
+                <a:avLst/>
+              </a:prstGeom>
+              <a:blipFill>
+                <a:blip r:embed="rId4"/>
+                <a:stretch>
+                  <a:fillRect/>
+                </a:stretch>
+              </a:blipFill>
+            </p:spPr>
+            <p:txBody>
+              <a:bodyPr/>
+              <a:lstStyle/>
+              <a:p>
+                <a:r>
+                  <a:rPr lang="en-GB">
+                    <a:noFill/>
+                  </a:rPr>
+                  <a:t> </a:t>
+                </a:r>
+              </a:p>
+            </p:txBody>
+          </p:sp>
+        </mc:Fallback>
+      </mc:AlternateContent>
+    </p:spTree>
+    <p:extLst>
+      <p:ext uri="{BB962C8B-B14F-4D97-AF65-F5344CB8AC3E}">
+        <p14:creationId xmlns:p14="http://schemas.microsoft.com/office/powerpoint/2010/main" val="3202317156"/>
+      </p:ext>
+    </p:extLst>
+  </p:cSld>
+  <p:clrMapOvr>
+    <a:masterClrMapping/>
+  </p:clrMapOvr>
+</p:sld>
+</file>
+
+<file path=ppt/slides/slide13.xml><?xml version="1.0" encoding="utf-8"?>
+<p:sld xmlns:a="http://schemas.openxmlformats.org/drawingml/2006/main" xmlns:r="http://schemas.openxmlformats.org/officeDocument/2006/relationships" xmlns:p="http://schemas.openxmlformats.org/presentationml/2006/main">
+  <p:cSld>
+    <p:spTree>
+      <p:nvGrpSpPr>
+        <p:cNvPr id="1" name=""/>
+        <p:cNvGrpSpPr/>
+        <p:nvPr/>
+      </p:nvGrpSpPr>
+      <p:grpSpPr>
+        <a:xfrm>
+          <a:off x="0" y="0"/>
+          <a:ext cx="0" cy="0"/>
+          <a:chOff x="0" y="0"/>
+          <a:chExt cx="0" cy="0"/>
+        </a:xfrm>
+      </p:grpSpPr>
+      <p:sp>
+        <p:nvSpPr>
+          <p:cNvPr id="2" name="Title 1">
+            <a:extLst>
+              <a:ext uri="{FF2B5EF4-FFF2-40B4-BE49-F238E27FC236}">
+                <a16:creationId xmlns:a16="http://schemas.microsoft.com/office/drawing/2014/main" id="{A6014D40-6D06-4C7F-9036-1D5405623EF5}"/>
+              </a:ext>
+            </a:extLst>
+          </p:cNvPr>
+          <p:cNvSpPr>
+            <a:spLocks noGrp="1"/>
+          </p:cNvSpPr>
+          <p:nvPr>
+            <p:ph type="title"/>
+          </p:nvPr>
+        </p:nvSpPr>
+        <p:spPr/>
+        <p:txBody>
+          <a:bodyPr/>
+          <a:lstStyle/>
+          <a:p>
+            <a:r>
+              <a:rPr lang="en-GB" dirty="0"/>
+              <a:t>Discussion: PA</a:t>
+            </a:r>
+          </a:p>
+        </p:txBody>
+      </p:sp>
+      <p:pic>
+        <p:nvPicPr>
+          <p:cNvPr id="6" name="Content Placeholder 5" descr="A screenshot of a cell phone&#10;&#10;Description automatically generated">
+            <a:extLst>
+              <a:ext uri="{FF2B5EF4-FFF2-40B4-BE49-F238E27FC236}">
+                <a16:creationId xmlns:a16="http://schemas.microsoft.com/office/drawing/2014/main" id="{B3D7BE89-CA3A-4972-A0E7-9A38EC630597}"/>
+              </a:ext>
+            </a:extLst>
+          </p:cNvPr>
+          <p:cNvPicPr>
+            <a:picLocks noGrp="1" noChangeAspect="1"/>
+          </p:cNvPicPr>
+          <p:nvPr>
+            <p:ph idx="1"/>
+          </p:nvPr>
+        </p:nvPicPr>
+        <p:blipFill>
+          <a:blip r:embed="rId2">
+            <a:extLst>
+              <a:ext uri="{28A0092B-C50C-407E-A947-70E740481C1C}">
+                <a14:useLocalDpi xmlns:a14="http://schemas.microsoft.com/office/drawing/2010/main" val="0"/>
+              </a:ext>
+            </a:extLst>
+          </a:blip>
+          <a:stretch>
+            <a:fillRect/>
+          </a:stretch>
+        </p:blipFill>
+        <p:spPr>
+          <a:xfrm>
+            <a:off x="2834586" y="1595438"/>
+            <a:ext cx="6522828" cy="4481512"/>
+          </a:xfrm>
+        </p:spPr>
+      </p:pic>
+      <p:sp>
+        <p:nvSpPr>
+          <p:cNvPr id="4" name="Slide Number Placeholder 3">
+            <a:extLst>
+              <a:ext uri="{FF2B5EF4-FFF2-40B4-BE49-F238E27FC236}">
+                <a16:creationId xmlns:a16="http://schemas.microsoft.com/office/drawing/2014/main" id="{3E691A1F-DF16-412E-BF82-A7EADC08642F}"/>
+              </a:ext>
+            </a:extLst>
+          </p:cNvPr>
+          <p:cNvSpPr>
+            <a:spLocks noGrp="1"/>
+          </p:cNvSpPr>
+          <p:nvPr>
+            <p:ph type="sldNum" sz="quarter" idx="12"/>
+          </p:nvPr>
+        </p:nvSpPr>
+        <p:spPr/>
+        <p:txBody>
+          <a:bodyPr/>
+          <a:lstStyle/>
+          <a:p>
+            <a:fld id="{6565F0C3-D9E9-4961-A3A4-87F2116D4289}" type="slidenum">
+              <a:rPr lang="en-GB" smtClean="0"/>
+              <a:t>13</a:t>
+            </a:fld>
+            <a:endParaRPr lang="en-GB" dirty="0"/>
+          </a:p>
+        </p:txBody>
+      </p:sp>
+      <p:sp>
+        <p:nvSpPr>
+          <p:cNvPr id="7" name="Rectangle 6">
+            <a:extLst>
+              <a:ext uri="{FF2B5EF4-FFF2-40B4-BE49-F238E27FC236}">
+                <a16:creationId xmlns:a16="http://schemas.microsoft.com/office/drawing/2014/main" id="{FCB182C7-0C67-4133-9AE4-8CEC63C7FCF7}"/>
+              </a:ext>
+            </a:extLst>
+          </p:cNvPr>
+          <p:cNvSpPr/>
+          <p:nvPr/>
+        </p:nvSpPr>
+        <p:spPr>
+          <a:xfrm>
+            <a:off x="6526635" y="4622334"/>
+            <a:ext cx="1786855" cy="1454616"/>
+          </a:xfrm>
+          <a:prstGeom prst="rect">
+            <a:avLst/>
+          </a:prstGeom>
+          <a:solidFill>
+            <a:schemeClr val="bg1"/>
+          </a:solidFill>
+          <a:ln>
+            <a:solidFill>
+              <a:schemeClr val="bg1"/>
+            </a:solidFill>
+          </a:ln>
+        </p:spPr>
+        <p:style>
+          <a:lnRef idx="2">
+            <a:schemeClr val="accent1">
+              <a:shade val="50000"/>
+            </a:schemeClr>
+          </a:lnRef>
+          <a:fillRef idx="1">
+            <a:schemeClr val="accent1"/>
+          </a:fillRef>
+          <a:effectRef idx="0">
+            <a:schemeClr val="accent1"/>
+          </a:effectRef>
+          <a:fontRef idx="minor">
+            <a:schemeClr val="lt1"/>
+          </a:fontRef>
+        </p:style>
+        <p:txBody>
+          <a:bodyPr rtlCol="0" anchor="ctr"/>
+          <a:lstStyle/>
+          <a:p>
+            <a:pPr algn="ctr"/>
+            <a:endParaRPr lang="en-GB"/>
+          </a:p>
+        </p:txBody>
+      </p:sp>
+    </p:spTree>
+    <p:extLst>
+      <p:ext uri="{BB962C8B-B14F-4D97-AF65-F5344CB8AC3E}">
+        <p14:creationId xmlns:p14="http://schemas.microsoft.com/office/powerpoint/2010/main" val="3623489308"/>
+      </p:ext>
+    </p:extLst>
+  </p:cSld>
+  <p:clrMapOvr>
+    <a:masterClrMapping/>
+  </p:clrMapOvr>
+  <p:timing>
+    <p:tnLst>
+      <p:par>
+        <p:cTn id="1" dur="indefinite" restart="never" nodeType="tmRoot">
+          <p:childTnLst>
+            <p:seq concurrent="1" nextAc="seek">
+              <p:cTn id="2" dur="indefinite" nodeType="mainSeq">
+                <p:childTnLst>
+                  <p:par>
+                    <p:cTn id="3" fill="hold">
+                      <p:stCondLst>
+                        <p:cond delay="indefinite"/>
+                      </p:stCondLst>
+                      <p:childTnLst>
+                        <p:par>
+                          <p:cTn id="4" fill="hold">
+                            <p:stCondLst>
+                              <p:cond delay="0"/>
+                            </p:stCondLst>
+                            <p:childTnLst>
+                              <p:par>
+                                <p:cTn id="5" presetID="1" presetClass="exit" presetSubtype="0" fill="hold" grpId="0" nodeType="clickEffect">
+                                  <p:stCondLst>
+                                    <p:cond delay="0"/>
+                                  </p:stCondLst>
+                                  <p:childTnLst>
+                                    <p:set>
+                                      <p:cBhvr>
+                                        <p:cTn id="6" dur="1" fill="hold">
+                                          <p:stCondLst>
+                                            <p:cond delay="0"/>
+                                          </p:stCondLst>
+                                        </p:cTn>
+                                        <p:tgtEl>
+                                          <p:spTgt spid="7"/>
+                                        </p:tgtEl>
+                                        <p:attrNameLst>
+                                          <p:attrName>style.visibility</p:attrName>
+                                        </p:attrNameLst>
+                                      </p:cBhvr>
+                                      <p:to>
+                                        <p:strVal val="hidden"/>
+                                      </p:to>
+                                    </p:set>
+                                  </p:childTnLst>
+                                </p:cTn>
+                              </p:par>
+                            </p:childTnLst>
+                          </p:cTn>
+                        </p:par>
+                      </p:childTnLst>
+                    </p:cTn>
+                  </p:par>
+                </p:childTnLst>
+              </p:cTn>
+              <p:prevCondLst>
+                <p:cond evt="onPrev" delay="0">
+                  <p:tgtEl>
+                    <p:sldTgt/>
+                  </p:tgtEl>
+                </p:cond>
+              </p:prevCondLst>
+              <p:nextCondLst>
+                <p:cond evt="onNext" delay="0">
+                  <p:tgtEl>
+                    <p:sldTgt/>
+                  </p:tgtEl>
+                </p:cond>
+              </p:nextCondLst>
+            </p:seq>
+          </p:childTnLst>
+        </p:cTn>
+      </p:par>
+    </p:tnLst>
+    <p:bldLst>
+      <p:bldP spid="7" grpId="0" animBg="1"/>
+    </p:bldLst>
+  </p:timing>
+</p:sld>
+</file>
+
+<file path=ppt/slides/slide14.xml><?xml version="1.0" encoding="utf-8"?>
+<p:sld xmlns:a="http://schemas.openxmlformats.org/drawingml/2006/main" xmlns:r="http://schemas.openxmlformats.org/officeDocument/2006/relationships" xmlns:p="http://schemas.openxmlformats.org/presentationml/2006/main">
+  <p:cSld>
+    <p:spTree>
+      <p:nvGrpSpPr>
+        <p:cNvPr id="1" name=""/>
+        <p:cNvGrpSpPr/>
+        <p:nvPr/>
+      </p:nvGrpSpPr>
+      <p:grpSpPr>
+        <a:xfrm>
+          <a:off x="0" y="0"/>
+          <a:ext cx="0" cy="0"/>
+          <a:chOff x="0" y="0"/>
+          <a:chExt cx="0" cy="0"/>
+        </a:xfrm>
+      </p:grpSpPr>
+      <p:sp>
+        <p:nvSpPr>
+          <p:cNvPr id="3" name="Content Placeholder 2">
+            <a:extLst>
+              <a:ext uri="{FF2B5EF4-FFF2-40B4-BE49-F238E27FC236}">
+                <a16:creationId xmlns:a16="http://schemas.microsoft.com/office/drawing/2014/main" id="{6D255345-3F65-4BEB-A293-F5B8FA3429F7}"/>
+              </a:ext>
+            </a:extLst>
+          </p:cNvPr>
+          <p:cNvSpPr>
+            <a:spLocks noGrp="1"/>
+          </p:cNvSpPr>
+          <p:nvPr>
+            <p:ph idx="1"/>
+          </p:nvPr>
+        </p:nvSpPr>
+        <p:spPr/>
+        <p:txBody>
+          <a:bodyPr>
+            <a:normAutofit fontScale="92500" lnSpcReduction="10000"/>
+          </a:bodyPr>
+          <a:lstStyle/>
+          <a:p>
+            <a:r>
+              <a:rPr lang="en-GB" dirty="0"/>
+              <a:t>Optimize SAG for gang tasks</a:t>
+            </a:r>
+          </a:p>
+          <a:p>
+            <a:pPr lvl="1"/>
+            <a:r>
+              <a:rPr lang="en-GB" noProof="0" dirty="0"/>
+              <a:t>SAG for gang tasks is slower than with non gang tasks due to checking for jobs x cores</a:t>
+            </a:r>
+          </a:p>
+          <a:p>
+            <a:pPr lvl="1"/>
+            <a:r>
+              <a:rPr lang="en-GB" noProof="0" dirty="0"/>
+              <a:t>There are some cases that could speed up the next state generation a bit</a:t>
+            </a:r>
+          </a:p>
+          <a:p>
+            <a:r>
+              <a:rPr lang="en-GB" noProof="0" dirty="0"/>
+              <a:t>Run schedulability analysis with precedence constraints</a:t>
+            </a:r>
+          </a:p>
+          <a:p>
+            <a:pPr marL="914400" lvl="1" indent="-457200">
+              <a:buFont typeface="+mj-lt"/>
+              <a:buAutoNum type="arabicPeriod"/>
+            </a:pPr>
+            <a:r>
+              <a:rPr lang="en-GB" noProof="0" dirty="0"/>
+              <a:t>Small batches in order to test further for bugs</a:t>
+            </a:r>
+          </a:p>
+          <a:p>
+            <a:pPr marL="914400" lvl="1" indent="-457200">
+              <a:buFont typeface="+mj-lt"/>
+              <a:buAutoNum type="arabicPeriod"/>
+            </a:pPr>
+            <a:r>
+              <a:rPr lang="en-GB" noProof="0" dirty="0"/>
+              <a:t>Once everything is clear run in cluster</a:t>
+            </a:r>
+          </a:p>
+          <a:p>
+            <a:r>
+              <a:rPr lang="en-GB" dirty="0"/>
+              <a:t>Finish simulator precedence constraints and test against SAG</a:t>
+            </a:r>
+          </a:p>
+          <a:p>
+            <a:r>
+              <a:rPr lang="en-GB" noProof="0" dirty="0"/>
+              <a:t>Create task sets with precedence constraints and jitter</a:t>
+            </a:r>
+            <a:endParaRPr lang="en-GB" dirty="0"/>
+          </a:p>
+          <a:p>
+            <a:pPr lvl="1"/>
+            <a:r>
+              <a:rPr lang="en-GB" noProof="0" dirty="0"/>
+              <a:t>Run them</a:t>
+            </a:r>
+          </a:p>
+          <a:p>
+            <a:r>
+              <a:rPr lang="en-GB" dirty="0"/>
+              <a:t>Try to solve the mistake of asking for the wrong number of hours</a:t>
+            </a:r>
+          </a:p>
+          <a:p>
+            <a:pPr lvl="1"/>
+            <a:r>
+              <a:rPr lang="en-GB" noProof="0" dirty="0"/>
+              <a:t>I don’t really have my hopes high for that… I think I will need to find other ways</a:t>
+            </a:r>
+          </a:p>
+        </p:txBody>
+      </p:sp>
+      <p:sp>
+        <p:nvSpPr>
+          <p:cNvPr id="2" name="Title 1">
+            <a:extLst>
+              <a:ext uri="{FF2B5EF4-FFF2-40B4-BE49-F238E27FC236}">
+                <a16:creationId xmlns:a16="http://schemas.microsoft.com/office/drawing/2014/main" id="{DA4D953D-18B3-4ED8-9A45-8E1463D8EF8E}"/>
+              </a:ext>
+            </a:extLst>
+          </p:cNvPr>
+          <p:cNvSpPr>
+            <a:spLocks noGrp="1"/>
+          </p:cNvSpPr>
+          <p:nvPr>
+            <p:ph type="title"/>
+          </p:nvPr>
+        </p:nvSpPr>
+        <p:spPr/>
+        <p:txBody>
+          <a:bodyPr/>
+          <a:lstStyle/>
+          <a:p>
+            <a:r>
+              <a:rPr lang="en-GB" dirty="0"/>
+              <a:t>What’s next?</a:t>
+            </a:r>
+            <a:endParaRPr lang="en-GB" noProof="0" dirty="0"/>
+          </a:p>
+        </p:txBody>
+      </p:sp>
+      <p:sp>
+        <p:nvSpPr>
+          <p:cNvPr id="4" name="Slide Number Placeholder 3">
+            <a:extLst>
+              <a:ext uri="{FF2B5EF4-FFF2-40B4-BE49-F238E27FC236}">
+                <a16:creationId xmlns:a16="http://schemas.microsoft.com/office/drawing/2014/main" id="{4EFBCA36-B18C-48FD-AE89-C5636B27A973}"/>
+              </a:ext>
+            </a:extLst>
+          </p:cNvPr>
+          <p:cNvSpPr>
+            <a:spLocks noGrp="1"/>
+          </p:cNvSpPr>
+          <p:nvPr>
+            <p:ph type="sldNum" sz="quarter" idx="12"/>
+          </p:nvPr>
+        </p:nvSpPr>
+        <p:spPr/>
+        <p:txBody>
+          <a:bodyPr/>
+          <a:lstStyle/>
+          <a:p>
+            <a:fld id="{6565F0C3-D9E9-4961-A3A4-87F2116D4289}" type="slidenum">
+              <a:rPr lang="en-GB" smtClean="0"/>
+              <a:t>14</a:t>
+            </a:fld>
+            <a:endParaRPr lang="en-GB" dirty="0"/>
+          </a:p>
+        </p:txBody>
+      </p:sp>
+    </p:spTree>
+    <p:extLst>
+      <p:ext uri="{BB962C8B-B14F-4D97-AF65-F5344CB8AC3E}">
+        <p14:creationId xmlns:p14="http://schemas.microsoft.com/office/powerpoint/2010/main" val="2525155807"/>
+      </p:ext>
+    </p:extLst>
+  </p:cSld>
+  <p:clrMapOvr>
+    <a:masterClrMapping/>
+  </p:clrMapOvr>
+  <p:timing>
+    <p:tnLst>
+      <p:par>
+        <p:cTn id="1" dur="indefinite" restart="never" nodeType="tmRoot">
+          <p:childTnLst>
+            <p:seq concurrent="1" nextAc="seek">
+              <p:cTn id="2" dur="indefinite" nodeType="mainSeq">
+                <p:childTnLst>
+                  <p:par>
+                    <p:cTn id="3" fill="hold">
+                      <p:stCondLst>
+                        <p:cond delay="indefinite"/>
+                        <p:cond evt="onBegin" delay="0">
+                          <p:tn val="2"/>
+                        </p:cond>
+                      </p:stCondLst>
+                      <p:childTnLst>
+                        <p:par>
+                          <p:cTn id="4" fill="hold">
+                            <p:stCondLst>
+                              <p:cond delay="0"/>
+                            </p:stCondLst>
+                            <p:childTnLst>
+                              <p:par>
+                                <p:cTn id="5" presetID="1" presetClass="entr" presetSubtype="0" fill="hold" grpId="0" nodeType="withEffect">
+                                  <p:stCondLst>
+                                    <p:cond delay="0"/>
+                                  </p:stCondLst>
+                                  <p:childTnLst>
+                                    <p:set>
+                                      <p:cBhvr>
+                                        <p:cTn id="6" dur="1" fill="hold">
+                                          <p:stCondLst>
+                                            <p:cond delay="0"/>
+                                          </p:stCondLst>
+                                        </p:cTn>
+                                        <p:tgtEl>
+                                          <p:spTgt spid="3">
+                                            <p:txEl>
+                                              <p:pRg st="0" end="0"/>
+                                            </p:txEl>
+                                          </p:spTgt>
+                                        </p:tgtEl>
+                                        <p:attrNameLst>
+                                          <p:attrName>style.visibility</p:attrName>
+                                        </p:attrNameLst>
+                                      </p:cBhvr>
+                                      <p:to>
+                                        <p:strVal val="visible"/>
+                                      </p:to>
+                                    </p:set>
+                                  </p:childTnLst>
+                                </p:cTn>
+                              </p:par>
+                              <p:par>
+                                <p:cTn id="7" presetID="1" presetClass="entr" presetSubtype="0" fill="hold" grpId="0" nodeType="withEffect">
+                                  <p:stCondLst>
+                                    <p:cond delay="0"/>
+                                  </p:stCondLst>
+                                  <p:childTnLst>
+                                    <p:set>
+                                      <p:cBhvr>
+                                        <p:cTn id="8" dur="1" fill="hold">
+                                          <p:stCondLst>
+                                            <p:cond delay="0"/>
+                                          </p:stCondLst>
+                                        </p:cTn>
+                                        <p:tgtEl>
+                                          <p:spTgt spid="3">
+                                            <p:txEl>
+                                              <p:pRg st="1" end="1"/>
+                                            </p:txEl>
+                                          </p:spTgt>
+                                        </p:tgtEl>
+                                        <p:attrNameLst>
+                                          <p:attrName>style.visibility</p:attrName>
+                                        </p:attrNameLst>
+                                      </p:cBhvr>
+                                      <p:to>
+                                        <p:strVal val="visible"/>
+                                      </p:to>
+                                    </p:set>
+                                  </p:childTnLst>
+                                </p:cTn>
+                              </p:par>
+                              <p:par>
+                                <p:cTn id="9" presetID="1" presetClass="entr" presetSubtype="0" fill="hold" grpId="0" nodeType="withEffect">
+                                  <p:stCondLst>
+                                    <p:cond delay="0"/>
+                                  </p:stCondLst>
+                                  <p:childTnLst>
+                                    <p:set>
+                                      <p:cBhvr>
+                                        <p:cTn id="10" dur="1" fill="hold">
+                                          <p:stCondLst>
+                                            <p:cond delay="0"/>
+                                          </p:stCondLst>
+                                        </p:cTn>
+                                        <p:tgtEl>
+                                          <p:spTgt spid="3">
+                                            <p:txEl>
+                                              <p:pRg st="2" end="2"/>
+                                            </p:txEl>
+                                          </p:spTgt>
+                                        </p:tgtEl>
+                                        <p:attrNameLst>
+                                          <p:attrName>style.visibility</p:attrName>
+                                        </p:attrNameLst>
+                                      </p:cBhvr>
+                                      <p:to>
+                                        <p:strVal val="visible"/>
+                                      </p:to>
+                                    </p:set>
+                                  </p:childTnLst>
+                                </p:cTn>
+                              </p:par>
+                            </p:childTnLst>
+                          </p:cTn>
+                        </p:par>
+                      </p:childTnLst>
+                    </p:cTn>
+                  </p:par>
+                  <p:par>
+                    <p:cTn id="11" fill="hold">
+                      <p:stCondLst>
+                        <p:cond delay="indefinite"/>
+                      </p:stCondLst>
+                      <p:childTnLst>
+                        <p:par>
+                          <p:cTn id="12" fill="hold">
+                            <p:stCondLst>
+                              <p:cond delay="0"/>
+                            </p:stCondLst>
+                            <p:childTnLst>
+                              <p:par>
+                                <p:cTn id="13" presetID="1" presetClass="entr" presetSubtype="0" fill="hold" grpId="0" nodeType="clickEffect">
+                                  <p:stCondLst>
+                                    <p:cond delay="0"/>
+                                  </p:stCondLst>
+                                  <p:childTnLst>
+                                    <p:set>
+                                      <p:cBhvr>
+                                        <p:cTn id="14" dur="1" fill="hold">
+                                          <p:stCondLst>
+                                            <p:cond delay="0"/>
+                                          </p:stCondLst>
+                                        </p:cTn>
+                                        <p:tgtEl>
+                                          <p:spTgt spid="3">
+                                            <p:txEl>
+                                              <p:pRg st="3" end="3"/>
+                                            </p:txEl>
+                                          </p:spTgt>
+                                        </p:tgtEl>
+                                        <p:attrNameLst>
+                                          <p:attrName>style.visibility</p:attrName>
+                                        </p:attrNameLst>
+                                      </p:cBhvr>
+                                      <p:to>
+                                        <p:strVal val="visible"/>
+                                      </p:to>
+                                    </p:set>
+                                  </p:childTnLst>
+                                </p:cTn>
+                              </p:par>
+                              <p:par>
+                                <p:cTn id="15" presetID="1" presetClass="entr" presetSubtype="0" fill="hold" grpId="0" nodeType="withEffect">
+                                  <p:stCondLst>
+                                    <p:cond delay="0"/>
+                                  </p:stCondLst>
+                                  <p:childTnLst>
+                                    <p:set>
+                                      <p:cBhvr>
+                                        <p:cTn id="16" dur="1" fill="hold">
+                                          <p:stCondLst>
+                                            <p:cond delay="0"/>
+                                          </p:stCondLst>
+                                        </p:cTn>
+                                        <p:tgtEl>
+                                          <p:spTgt spid="3">
+                                            <p:txEl>
+                                              <p:pRg st="4" end="4"/>
+                                            </p:txEl>
+                                          </p:spTgt>
+                                        </p:tgtEl>
+                                        <p:attrNameLst>
+                                          <p:attrName>style.visibility</p:attrName>
+                                        </p:attrNameLst>
+                                      </p:cBhvr>
+                                      <p:to>
+                                        <p:strVal val="visible"/>
+                                      </p:to>
+                                    </p:set>
+                                  </p:childTnLst>
+                                </p:cTn>
+                              </p:par>
+                              <p:par>
+                                <p:cTn id="17" presetID="1" presetClass="entr" presetSubtype="0" fill="hold" grpId="0" nodeType="withEffect">
+                                  <p:stCondLst>
+                                    <p:cond delay="0"/>
+                                  </p:stCondLst>
+                                  <p:childTnLst>
+                                    <p:set>
+                                      <p:cBhvr>
+                                        <p:cTn id="18" dur="1" fill="hold">
+                                          <p:stCondLst>
+                                            <p:cond delay="0"/>
+                                          </p:stCondLst>
+                                        </p:cTn>
+                                        <p:tgtEl>
+                                          <p:spTgt spid="3">
+                                            <p:txEl>
+                                              <p:pRg st="5" end="5"/>
+                                            </p:txEl>
+                                          </p:spTgt>
+                                        </p:tgtEl>
+                                        <p:attrNameLst>
+                                          <p:attrName>style.visibility</p:attrName>
+                                        </p:attrNameLst>
+                                      </p:cBhvr>
+                                      <p:to>
+                                        <p:strVal val="visible"/>
+                                      </p:to>
+                                    </p:set>
+                                  </p:childTnLst>
+                                </p:cTn>
+                              </p:par>
+                            </p:childTnLst>
+                          </p:cTn>
+                        </p:par>
+                      </p:childTnLst>
+                    </p:cTn>
+                  </p:par>
+                  <p:par>
+                    <p:cTn id="19" fill="hold">
+                      <p:stCondLst>
+                        <p:cond delay="indefinite"/>
+                      </p:stCondLst>
+                      <p:childTnLst>
+                        <p:par>
+                          <p:cTn id="20" fill="hold">
+                            <p:stCondLst>
+                              <p:cond delay="0"/>
+                            </p:stCondLst>
+                            <p:childTnLst>
+                              <p:par>
+                                <p:cTn id="21" presetID="1" presetClass="entr" presetSubtype="0" fill="hold" grpId="0" nodeType="clickEffect">
+                                  <p:stCondLst>
+                                    <p:cond delay="0"/>
+                                  </p:stCondLst>
+                                  <p:childTnLst>
+                                    <p:set>
+                                      <p:cBhvr>
+                                        <p:cTn id="22" dur="1" fill="hold">
+                                          <p:stCondLst>
+                                            <p:cond delay="0"/>
+                                          </p:stCondLst>
+                                        </p:cTn>
+                                        <p:tgtEl>
+                                          <p:spTgt spid="3">
+                                            <p:txEl>
+                                              <p:pRg st="6" end="6"/>
+                                            </p:txEl>
+                                          </p:spTgt>
+                                        </p:tgtEl>
+                                        <p:attrNameLst>
+                                          <p:attrName>style.visibility</p:attrName>
+                                        </p:attrNameLst>
+                                      </p:cBhvr>
+                                      <p:to>
+                                        <p:strVal val="visible"/>
+                                      </p:to>
+                                    </p:set>
+                                  </p:childTnLst>
+                                </p:cTn>
+                              </p:par>
+                            </p:childTnLst>
+                          </p:cTn>
+                        </p:par>
+                      </p:childTnLst>
+                    </p:cTn>
+                  </p:par>
+                  <p:par>
+                    <p:cTn id="23" fill="hold">
+                      <p:stCondLst>
+                        <p:cond delay="indefinite"/>
+                      </p:stCondLst>
+                      <p:childTnLst>
+                        <p:par>
+                          <p:cTn id="24" fill="hold">
+                            <p:stCondLst>
+                              <p:cond delay="0"/>
+                            </p:stCondLst>
+                            <p:childTnLst>
+                              <p:par>
+                                <p:cTn id="25" presetID="1" presetClass="entr" presetSubtype="0" fill="hold" grpId="0" nodeType="clickEffect">
+                                  <p:stCondLst>
+                                    <p:cond delay="0"/>
+                                  </p:stCondLst>
+                                  <p:childTnLst>
+                                    <p:set>
+                                      <p:cBhvr>
+                                        <p:cTn id="26" dur="1" fill="hold">
+                                          <p:stCondLst>
+                                            <p:cond delay="0"/>
+                                          </p:stCondLst>
+                                        </p:cTn>
+                                        <p:tgtEl>
+                                          <p:spTgt spid="3">
+                                            <p:txEl>
+                                              <p:pRg st="7" end="7"/>
+                                            </p:txEl>
+                                          </p:spTgt>
+                                        </p:tgtEl>
+                                        <p:attrNameLst>
+                                          <p:attrName>style.visibility</p:attrName>
+                                        </p:attrNameLst>
+                                      </p:cBhvr>
+                                      <p:to>
+                                        <p:strVal val="visible"/>
+                                      </p:to>
+                                    </p:set>
+                                  </p:childTnLst>
+                                </p:cTn>
+                              </p:par>
+                              <p:par>
+                                <p:cTn id="27" presetID="1" presetClass="entr" presetSubtype="0" fill="hold" grpId="0" nodeType="withEffect">
+                                  <p:stCondLst>
+                                    <p:cond delay="0"/>
+                                  </p:stCondLst>
+                                  <p:childTnLst>
+                                    <p:set>
+                                      <p:cBhvr>
+                                        <p:cTn id="28" dur="1" fill="hold">
+                                          <p:stCondLst>
+                                            <p:cond delay="0"/>
+                                          </p:stCondLst>
+                                        </p:cTn>
+                                        <p:tgtEl>
+                                          <p:spTgt spid="3">
+                                            <p:txEl>
+                                              <p:pRg st="8" end="8"/>
+                                            </p:txEl>
+                                          </p:spTgt>
+                                        </p:tgtEl>
+                                        <p:attrNameLst>
+                                          <p:attrName>style.visibility</p:attrName>
+                                        </p:attrNameLst>
+                                      </p:cBhvr>
+                                      <p:to>
+                                        <p:strVal val="visible"/>
+                                      </p:to>
+                                    </p:set>
+                                  </p:childTnLst>
+                                </p:cTn>
+                              </p:par>
+                            </p:childTnLst>
+                          </p:cTn>
+                        </p:par>
+                      </p:childTnLst>
+                    </p:cTn>
+                  </p:par>
+                  <p:par>
+                    <p:cTn id="29" fill="hold">
+                      <p:stCondLst>
+                        <p:cond delay="indefinite"/>
+                      </p:stCondLst>
+                      <p:childTnLst>
+                        <p:par>
+                          <p:cTn id="30" fill="hold">
+                            <p:stCondLst>
+                              <p:cond delay="0"/>
+                            </p:stCondLst>
+                            <p:childTnLst>
+                              <p:par>
+                                <p:cTn id="31" presetID="1" presetClass="entr" presetSubtype="0" fill="hold" grpId="0" nodeType="clickEffect">
+                                  <p:stCondLst>
+                                    <p:cond delay="0"/>
+                                  </p:stCondLst>
+                                  <p:childTnLst>
+                                    <p:set>
+                                      <p:cBhvr>
+                                        <p:cTn id="32" dur="1" fill="hold">
+                                          <p:stCondLst>
+                                            <p:cond delay="0"/>
+                                          </p:stCondLst>
+                                        </p:cTn>
+                                        <p:tgtEl>
+                                          <p:spTgt spid="3">
+                                            <p:txEl>
+                                              <p:pRg st="9" end="9"/>
+                                            </p:txEl>
+                                          </p:spTgt>
+                                        </p:tgtEl>
+                                        <p:attrNameLst>
+                                          <p:attrName>style.visibility</p:attrName>
+                                        </p:attrNameLst>
+                                      </p:cBhvr>
+                                      <p:to>
+                                        <p:strVal val="visible"/>
+                                      </p:to>
+                                    </p:set>
+                                  </p:childTnLst>
+                                </p:cTn>
+                              </p:par>
+                              <p:par>
+                                <p:cTn id="33" presetID="1" presetClass="entr" presetSubtype="0" fill="hold" grpId="0" nodeType="withEffect">
+                                  <p:stCondLst>
+                                    <p:cond delay="0"/>
+                                  </p:stCondLst>
+                                  <p:childTnLst>
+                                    <p:set>
+                                      <p:cBhvr>
+                                        <p:cTn id="34" dur="1" fill="hold">
+                                          <p:stCondLst>
+                                            <p:cond delay="0"/>
+                                          </p:stCondLst>
+                                        </p:cTn>
+                                        <p:tgtEl>
+                                          <p:spTgt spid="3">
+                                            <p:txEl>
+                                              <p:pRg st="10" end="10"/>
                                             </p:txEl>
                                           </p:spTgt>
                                         </p:tgtEl>
@@ -10119,7 +12775,7 @@
         <p:spPr/>
         <p:txBody>
           <a:bodyPr>
-            <a:normAutofit lnSpcReduction="10000"/>
+            <a:normAutofit/>
           </a:bodyPr>
           <a:lstStyle/>
           <a:p>
@@ -10177,15 +12833,6 @@
               <a:rPr lang="en-GB" dirty="0"/>
               <a:t>Generate tasks with precedence constraints</a:t>
             </a:r>
-          </a:p>
-          <a:p>
-            <a:r>
-              <a:rPr lang="en-GB" dirty="0"/>
-              <a:t>Maybe we have too many task sets to evaluate, reduce some of the tests?</a:t>
-            </a:r>
-          </a:p>
-          <a:p>
-            <a:endParaRPr lang="en-150" noProof="0" dirty="0"/>
           </a:p>
         </p:txBody>
       </p:sp>
@@ -10650,55 +13297,6 @@
                                           <p:spTgt spid="3">
                                             <p:txEl>
                                               <p:pRg st="7" end="7"/>
-                                            </p:txEl>
-                                          </p:spTgt>
-                                        </p:tgtEl>
-                                        <p:attrNameLst>
-                                          <p:attrName>style.visibility</p:attrName>
-                                        </p:attrNameLst>
-                                      </p:cBhvr>
-                                      <p:to>
-                                        <p:strVal val="visible"/>
-                                      </p:to>
-                                    </p:set>
-                                  </p:childTnLst>
-                                </p:cTn>
-                              </p:par>
-                            </p:childTnLst>
-                          </p:cTn>
-                        </p:par>
-                      </p:childTnLst>
-                    </p:cTn>
-                  </p:par>
-                  <p:par>
-                    <p:cTn id="29" fill="hold">
-                      <p:stCondLst>
-                        <p:cond delay="indefinite"/>
-                      </p:stCondLst>
-                      <p:childTnLst>
-                        <p:par>
-                          <p:cTn id="30" fill="hold">
-                            <p:stCondLst>
-                              <p:cond delay="0"/>
-                            </p:stCondLst>
-                            <p:childTnLst>
-                              <p:par>
-                                <p:cTn id="31" presetID="1" presetClass="entr" presetSubtype="0" fill="hold" grpId="0" nodeType="clickEffect">
-                                  <p:stCondLst>
-                                    <p:cond delay="0"/>
-                                  </p:stCondLst>
-                                  <p:childTnLst>
-                                    <p:set>
-                                      <p:cBhvr>
-                                        <p:cTn id="32" dur="1" fill="hold">
-                                          <p:stCondLst>
-                                            <p:cond delay="0"/>
-                                          </p:stCondLst>
-                                        </p:cTn>
-                                        <p:tgtEl>
-                                          <p:spTgt spid="3">
-                                            <p:txEl>
-                                              <p:pRg st="8" end="8"/>
                                             </p:txEl>
                                           </p:spTgt>
                                         </p:tgtEl>

</xml_diff>